<commit_message>
Project Overview pptx updated
</commit_message>
<xml_diff>
--- a/files/Project Overview.pptx
+++ b/files/Project Overview.pptx
@@ -10,7 +10,8 @@
     <p:sldId id="258" r:id="rId4"/>
     <p:sldId id="259" r:id="rId5"/>
     <p:sldId id="260" r:id="rId6"/>
-    <p:sldId id="261" r:id="rId7"/>
+    <p:sldId id="262" r:id="rId7"/>
+    <p:sldId id="261" r:id="rId8"/>
   </p:sldIdLst>
   <p:sldSz cx="12192000" cy="6858000"/>
   <p:notesSz cx="6858000" cy="9144000"/>
@@ -266,7 +267,7 @@
           <a:p>
             <a:fld id="{B6275C59-733F-4DEF-B050-A985187669F4}" type="datetimeFigureOut">
               <a:rPr lang="en-CA" smtClean="0"/>
-              <a:t>2023-07-29</a:t>
+              <a:t>2023-09-15</a:t>
             </a:fld>
             <a:endParaRPr lang="en-CA"/>
           </a:p>
@@ -466,7 +467,7 @@
           <a:p>
             <a:fld id="{B6275C59-733F-4DEF-B050-A985187669F4}" type="datetimeFigureOut">
               <a:rPr lang="en-CA" smtClean="0"/>
-              <a:t>2023-07-29</a:t>
+              <a:t>2023-09-15</a:t>
             </a:fld>
             <a:endParaRPr lang="en-CA"/>
           </a:p>
@@ -676,7 +677,7 @@
           <a:p>
             <a:fld id="{B6275C59-733F-4DEF-B050-A985187669F4}" type="datetimeFigureOut">
               <a:rPr lang="en-CA" smtClean="0"/>
-              <a:t>2023-07-29</a:t>
+              <a:t>2023-09-15</a:t>
             </a:fld>
             <a:endParaRPr lang="en-CA"/>
           </a:p>
@@ -876,7 +877,7 @@
           <a:p>
             <a:fld id="{B6275C59-733F-4DEF-B050-A985187669F4}" type="datetimeFigureOut">
               <a:rPr lang="en-CA" smtClean="0"/>
-              <a:t>2023-07-29</a:t>
+              <a:t>2023-09-15</a:t>
             </a:fld>
             <a:endParaRPr lang="en-CA"/>
           </a:p>
@@ -1152,7 +1153,7 @@
           <a:p>
             <a:fld id="{B6275C59-733F-4DEF-B050-A985187669F4}" type="datetimeFigureOut">
               <a:rPr lang="en-CA" smtClean="0"/>
-              <a:t>2023-07-29</a:t>
+              <a:t>2023-09-15</a:t>
             </a:fld>
             <a:endParaRPr lang="en-CA"/>
           </a:p>
@@ -1420,7 +1421,7 @@
           <a:p>
             <a:fld id="{B6275C59-733F-4DEF-B050-A985187669F4}" type="datetimeFigureOut">
               <a:rPr lang="en-CA" smtClean="0"/>
-              <a:t>2023-07-29</a:t>
+              <a:t>2023-09-15</a:t>
             </a:fld>
             <a:endParaRPr lang="en-CA"/>
           </a:p>
@@ -1835,7 +1836,7 @@
           <a:p>
             <a:fld id="{B6275C59-733F-4DEF-B050-A985187669F4}" type="datetimeFigureOut">
               <a:rPr lang="en-CA" smtClean="0"/>
-              <a:t>2023-07-29</a:t>
+              <a:t>2023-09-15</a:t>
             </a:fld>
             <a:endParaRPr lang="en-CA"/>
           </a:p>
@@ -1977,7 +1978,7 @@
           <a:p>
             <a:fld id="{B6275C59-733F-4DEF-B050-A985187669F4}" type="datetimeFigureOut">
               <a:rPr lang="en-CA" smtClean="0"/>
-              <a:t>2023-07-29</a:t>
+              <a:t>2023-09-15</a:t>
             </a:fld>
             <a:endParaRPr lang="en-CA"/>
           </a:p>
@@ -2090,7 +2091,7 @@
           <a:p>
             <a:fld id="{B6275C59-733F-4DEF-B050-A985187669F4}" type="datetimeFigureOut">
               <a:rPr lang="en-CA" smtClean="0"/>
-              <a:t>2023-07-29</a:t>
+              <a:t>2023-09-15</a:t>
             </a:fld>
             <a:endParaRPr lang="en-CA"/>
           </a:p>
@@ -2403,7 +2404,7 @@
           <a:p>
             <a:fld id="{B6275C59-733F-4DEF-B050-A985187669F4}" type="datetimeFigureOut">
               <a:rPr lang="en-CA" smtClean="0"/>
-              <a:t>2023-07-29</a:t>
+              <a:t>2023-09-15</a:t>
             </a:fld>
             <a:endParaRPr lang="en-CA"/>
           </a:p>
@@ -2692,7 +2693,7 @@
           <a:p>
             <a:fld id="{B6275C59-733F-4DEF-B050-A985187669F4}" type="datetimeFigureOut">
               <a:rPr lang="en-CA" smtClean="0"/>
-              <a:t>2023-07-29</a:t>
+              <a:t>2023-09-15</a:t>
             </a:fld>
             <a:endParaRPr lang="en-CA"/>
           </a:p>
@@ -2935,7 +2936,7 @@
           <a:p>
             <a:fld id="{B6275C59-733F-4DEF-B050-A985187669F4}" type="datetimeFigureOut">
               <a:rPr lang="en-CA" smtClean="0"/>
-              <a:t>2023-07-29</a:t>
+              <a:t>2023-09-15</a:t>
             </a:fld>
             <a:endParaRPr lang="en-CA"/>
           </a:p>
@@ -4251,6 +4252,1013 @@
 </file>
 
 <file path=ppt/slides/slide5.xml><?xml version="1.0" encoding="utf-8"?>
+<p:sld xmlns:a="http://schemas.openxmlformats.org/drawingml/2006/main" xmlns:r="http://schemas.openxmlformats.org/officeDocument/2006/relationships" xmlns:p="http://schemas.openxmlformats.org/presentationml/2006/main" show="0">
+  <p:cSld>
+    <p:spTree>
+      <p:nvGrpSpPr>
+        <p:cNvPr id="1" name=""/>
+        <p:cNvGrpSpPr/>
+        <p:nvPr/>
+      </p:nvGrpSpPr>
+      <p:grpSpPr>
+        <a:xfrm>
+          <a:off x="0" y="0"/>
+          <a:ext cx="0" cy="0"/>
+          <a:chOff x="0" y="0"/>
+          <a:chExt cx="0" cy="0"/>
+        </a:xfrm>
+      </p:grpSpPr>
+      <p:sp>
+        <p:nvSpPr>
+          <p:cNvPr id="2" name="Title 1">
+            <a:extLst>
+              <a:ext uri="{FF2B5EF4-FFF2-40B4-BE49-F238E27FC236}">
+                <a16:creationId xmlns:a16="http://schemas.microsoft.com/office/drawing/2014/main" id="{E11BB9E5-DA2D-2B34-B5C6-E2FF1A8C3E73}"/>
+              </a:ext>
+            </a:extLst>
+          </p:cNvPr>
+          <p:cNvSpPr>
+            <a:spLocks noGrp="1"/>
+          </p:cNvSpPr>
+          <p:nvPr>
+            <p:ph type="title"/>
+          </p:nvPr>
+        </p:nvSpPr>
+        <p:spPr/>
+        <p:txBody>
+          <a:bodyPr/>
+          <a:lstStyle/>
+          <a:p>
+            <a:r>
+              <a:rPr lang="en-CA" dirty="0">
+                <a:latin typeface="Aptos" panose="020B0004020202020204" pitchFamily="34" charset="0"/>
+              </a:rPr>
+              <a:t>Project Flow</a:t>
+            </a:r>
+          </a:p>
+        </p:txBody>
+      </p:sp>
+      <p:sp>
+        <p:nvSpPr>
+          <p:cNvPr id="12" name="Rectangle: Rounded Corners 11">
+            <a:extLst>
+              <a:ext uri="{FF2B5EF4-FFF2-40B4-BE49-F238E27FC236}">
+                <a16:creationId xmlns:a16="http://schemas.microsoft.com/office/drawing/2014/main" id="{52137374-F8BA-0FBA-24B7-84247E849BA3}"/>
+              </a:ext>
+            </a:extLst>
+          </p:cNvPr>
+          <p:cNvSpPr/>
+          <p:nvPr/>
+        </p:nvSpPr>
+        <p:spPr>
+          <a:xfrm>
+            <a:off x="126024" y="3094891"/>
+            <a:ext cx="1354015" cy="1485900"/>
+          </a:xfrm>
+          <a:prstGeom prst="roundRect">
+            <a:avLst/>
+          </a:prstGeom>
+        </p:spPr>
+        <p:style>
+          <a:lnRef idx="2">
+            <a:schemeClr val="accent1">
+              <a:shade val="15000"/>
+            </a:schemeClr>
+          </a:lnRef>
+          <a:fillRef idx="1">
+            <a:schemeClr val="accent1"/>
+          </a:fillRef>
+          <a:effectRef idx="0">
+            <a:schemeClr val="accent1"/>
+          </a:effectRef>
+          <a:fontRef idx="minor">
+            <a:schemeClr val="lt1"/>
+          </a:fontRef>
+        </p:style>
+        <p:txBody>
+          <a:bodyPr rtlCol="0" anchor="ctr"/>
+          <a:lstStyle/>
+          <a:p>
+            <a:pPr algn="ctr"/>
+            <a:r>
+              <a:rPr lang="en-CA" b="1" dirty="0">
+                <a:latin typeface="Aptos" panose="020B0004020202020204" pitchFamily="34" charset="0"/>
+              </a:rPr>
+              <a:t>Check out date</a:t>
+            </a:r>
+          </a:p>
+        </p:txBody>
+      </p:sp>
+      <p:sp>
+        <p:nvSpPr>
+          <p:cNvPr id="13" name="Rectangle: Rounded Corners 12">
+            <a:extLst>
+              <a:ext uri="{FF2B5EF4-FFF2-40B4-BE49-F238E27FC236}">
+                <a16:creationId xmlns:a16="http://schemas.microsoft.com/office/drawing/2014/main" id="{03281E48-023C-C1C1-8B3A-814660E4DDFE}"/>
+              </a:ext>
+            </a:extLst>
+          </p:cNvPr>
+          <p:cNvSpPr/>
+          <p:nvPr/>
+        </p:nvSpPr>
+        <p:spPr>
+          <a:xfrm>
+            <a:off x="2406166" y="3094891"/>
+            <a:ext cx="1737946" cy="1485900"/>
+          </a:xfrm>
+          <a:prstGeom prst="roundRect">
+            <a:avLst/>
+          </a:prstGeom>
+        </p:spPr>
+        <p:style>
+          <a:lnRef idx="2">
+            <a:schemeClr val="accent1">
+              <a:shade val="15000"/>
+            </a:schemeClr>
+          </a:lnRef>
+          <a:fillRef idx="1">
+            <a:schemeClr val="accent1"/>
+          </a:fillRef>
+          <a:effectRef idx="0">
+            <a:schemeClr val="accent1"/>
+          </a:effectRef>
+          <a:fontRef idx="minor">
+            <a:schemeClr val="lt1"/>
+          </a:fontRef>
+        </p:style>
+        <p:txBody>
+          <a:bodyPr rtlCol="0" anchor="ctr"/>
+          <a:lstStyle/>
+          <a:p>
+            <a:pPr algn="ctr"/>
+            <a:r>
+              <a:rPr lang="en-CA" b="1" dirty="0">
+                <a:latin typeface="Aptos" panose="020B0004020202020204" pitchFamily="34" charset="0"/>
+              </a:rPr>
+              <a:t>Check if monthly database exists</a:t>
+            </a:r>
+          </a:p>
+        </p:txBody>
+      </p:sp>
+      <p:sp>
+        <p:nvSpPr>
+          <p:cNvPr id="14" name="Arrow: Right 13">
+            <a:extLst>
+              <a:ext uri="{FF2B5EF4-FFF2-40B4-BE49-F238E27FC236}">
+                <a16:creationId xmlns:a16="http://schemas.microsoft.com/office/drawing/2014/main" id="{AA106134-0B03-F90E-4D22-DA6E40ABE301}"/>
+              </a:ext>
+            </a:extLst>
+          </p:cNvPr>
+          <p:cNvSpPr/>
+          <p:nvPr/>
+        </p:nvSpPr>
+        <p:spPr>
+          <a:xfrm>
+            <a:off x="1560639" y="3534506"/>
+            <a:ext cx="773723" cy="606669"/>
+          </a:xfrm>
+          <a:prstGeom prst="rightArrow">
+            <a:avLst/>
+          </a:prstGeom>
+          <a:ln>
+            <a:noFill/>
+          </a:ln>
+        </p:spPr>
+        <p:style>
+          <a:lnRef idx="2">
+            <a:schemeClr val="accent1">
+              <a:shade val="15000"/>
+            </a:schemeClr>
+          </a:lnRef>
+          <a:fillRef idx="1">
+            <a:schemeClr val="accent1"/>
+          </a:fillRef>
+          <a:effectRef idx="0">
+            <a:schemeClr val="accent1"/>
+          </a:effectRef>
+          <a:fontRef idx="minor">
+            <a:schemeClr val="lt1"/>
+          </a:fontRef>
+        </p:style>
+        <p:txBody>
+          <a:bodyPr rtlCol="0" anchor="ctr"/>
+          <a:lstStyle/>
+          <a:p>
+            <a:pPr algn="ctr"/>
+            <a:endParaRPr lang="en-CA"/>
+          </a:p>
+        </p:txBody>
+      </p:sp>
+      <p:sp>
+        <p:nvSpPr>
+          <p:cNvPr id="15" name="TextBox 14">
+            <a:extLst>
+              <a:ext uri="{FF2B5EF4-FFF2-40B4-BE49-F238E27FC236}">
+                <a16:creationId xmlns:a16="http://schemas.microsoft.com/office/drawing/2014/main" id="{AC5C79EC-71EC-BC17-7B05-C5B1C81D45E5}"/>
+              </a:ext>
+            </a:extLst>
+          </p:cNvPr>
+          <p:cNvSpPr txBox="1"/>
+          <p:nvPr/>
+        </p:nvSpPr>
+        <p:spPr>
+          <a:xfrm>
+            <a:off x="1468266" y="2826629"/>
+            <a:ext cx="905715" cy="646331"/>
+          </a:xfrm>
+          <a:prstGeom prst="rect">
+            <a:avLst/>
+          </a:prstGeom>
+          <a:noFill/>
+        </p:spPr>
+        <p:txBody>
+          <a:bodyPr wrap="square" rtlCol="0">
+            <a:spAutoFit/>
+          </a:bodyPr>
+          <a:lstStyle/>
+          <a:p>
+            <a:pPr algn="ctr"/>
+            <a:r>
+              <a:rPr lang="en-CA" dirty="0">
+                <a:latin typeface="Aptos" panose="020B0004020202020204" pitchFamily="34" charset="0"/>
+              </a:rPr>
+              <a:t>07/24/2023</a:t>
+            </a:r>
+          </a:p>
+        </p:txBody>
+      </p:sp>
+      <p:pic>
+        <p:nvPicPr>
+          <p:cNvPr id="16" name="Picture 4" descr="upload.wikimedia.org/wikipedia/commons/4/45/Not...">
+            <a:extLst>
+              <a:ext uri="{FF2B5EF4-FFF2-40B4-BE49-F238E27FC236}">
+                <a16:creationId xmlns:a16="http://schemas.microsoft.com/office/drawing/2014/main" id="{F48D579E-00EF-F565-13E6-3BC15E5B22F7}"/>
+              </a:ext>
+            </a:extLst>
+          </p:cNvPr>
+          <p:cNvPicPr>
+            <a:picLocks noChangeAspect="1" noChangeArrowheads="1"/>
+          </p:cNvPicPr>
+          <p:nvPr/>
+        </p:nvPicPr>
+        <p:blipFill>
+          <a:blip r:embed="rId2">
+            <a:extLst>
+              <a:ext uri="{28A0092B-C50C-407E-A947-70E740481C1C}">
+                <a14:useLocalDpi xmlns:a14="http://schemas.microsoft.com/office/drawing/2010/main" val="0"/>
+              </a:ext>
+            </a:extLst>
+          </a:blip>
+          <a:srcRect/>
+          <a:stretch>
+            <a:fillRect/>
+          </a:stretch>
+        </p:blipFill>
+        <p:spPr bwMode="auto">
+          <a:xfrm>
+            <a:off x="2884190" y="1575703"/>
+            <a:ext cx="811311" cy="811311"/>
+          </a:xfrm>
+          <a:prstGeom prst="rect">
+            <a:avLst/>
+          </a:prstGeom>
+          <a:noFill/>
+          <a:extLst>
+            <a:ext uri="{909E8E84-426E-40DD-AFC4-6F175D3DCCD1}">
+              <a14:hiddenFill xmlns:a14="http://schemas.microsoft.com/office/drawing/2010/main">
+                <a:solidFill>
+                  <a:srgbClr val="FFFFFF"/>
+                </a:solidFill>
+              </a14:hiddenFill>
+            </a:ext>
+          </a:extLst>
+        </p:spPr>
+      </p:pic>
+      <p:sp>
+        <p:nvSpPr>
+          <p:cNvPr id="17" name="TextBox 16">
+            <a:extLst>
+              <a:ext uri="{FF2B5EF4-FFF2-40B4-BE49-F238E27FC236}">
+                <a16:creationId xmlns:a16="http://schemas.microsoft.com/office/drawing/2014/main" id="{B0473DFF-2D07-E9F6-DA42-33F305F4B572}"/>
+              </a:ext>
+            </a:extLst>
+          </p:cNvPr>
+          <p:cNvSpPr txBox="1"/>
+          <p:nvPr/>
+        </p:nvSpPr>
+        <p:spPr>
+          <a:xfrm>
+            <a:off x="2250889" y="2387014"/>
+            <a:ext cx="2077915" cy="646331"/>
+          </a:xfrm>
+          <a:prstGeom prst="rect">
+            <a:avLst/>
+          </a:prstGeom>
+          <a:noFill/>
+        </p:spPr>
+        <p:txBody>
+          <a:bodyPr wrap="square" rtlCol="0">
+            <a:spAutoFit/>
+          </a:bodyPr>
+          <a:lstStyle/>
+          <a:p>
+            <a:pPr algn="ctr"/>
+            <a:r>
+              <a:rPr lang="en-CA" dirty="0">
+                <a:latin typeface="Aptos" panose="020B0004020202020204" pitchFamily="34" charset="0"/>
+              </a:rPr>
+              <a:t>Does “July 2023” database exist?</a:t>
+            </a:r>
+          </a:p>
+        </p:txBody>
+      </p:sp>
+      <p:sp>
+        <p:nvSpPr>
+          <p:cNvPr id="18" name="Arrow: Down 17">
+            <a:extLst>
+              <a:ext uri="{FF2B5EF4-FFF2-40B4-BE49-F238E27FC236}">
+                <a16:creationId xmlns:a16="http://schemas.microsoft.com/office/drawing/2014/main" id="{72445445-A3BA-0E8F-6C77-B37B4AFB42F9}"/>
+              </a:ext>
+            </a:extLst>
+          </p:cNvPr>
+          <p:cNvSpPr/>
+          <p:nvPr/>
+        </p:nvSpPr>
+        <p:spPr>
+          <a:xfrm>
+            <a:off x="2989389" y="4719586"/>
+            <a:ext cx="571500" cy="703385"/>
+          </a:xfrm>
+          <a:prstGeom prst="downArrow">
+            <a:avLst/>
+          </a:prstGeom>
+          <a:solidFill>
+            <a:srgbClr val="C00000"/>
+          </a:solidFill>
+          <a:ln>
+            <a:noFill/>
+          </a:ln>
+        </p:spPr>
+        <p:style>
+          <a:lnRef idx="2">
+            <a:schemeClr val="accent1">
+              <a:shade val="15000"/>
+            </a:schemeClr>
+          </a:lnRef>
+          <a:fillRef idx="1">
+            <a:schemeClr val="accent1"/>
+          </a:fillRef>
+          <a:effectRef idx="0">
+            <a:schemeClr val="accent1"/>
+          </a:effectRef>
+          <a:fontRef idx="minor">
+            <a:schemeClr val="lt1"/>
+          </a:fontRef>
+        </p:style>
+        <p:txBody>
+          <a:bodyPr rtlCol="0" anchor="ctr"/>
+          <a:lstStyle/>
+          <a:p>
+            <a:pPr algn="ctr"/>
+            <a:endParaRPr lang="en-CA"/>
+          </a:p>
+        </p:txBody>
+      </p:sp>
+      <p:sp>
+        <p:nvSpPr>
+          <p:cNvPr id="19" name="TextBox 18">
+            <a:extLst>
+              <a:ext uri="{FF2B5EF4-FFF2-40B4-BE49-F238E27FC236}">
+                <a16:creationId xmlns:a16="http://schemas.microsoft.com/office/drawing/2014/main" id="{1D3C81CF-1177-96CE-8E48-390D25988D5A}"/>
+              </a:ext>
+            </a:extLst>
+          </p:cNvPr>
+          <p:cNvSpPr txBox="1"/>
+          <p:nvPr/>
+        </p:nvSpPr>
+        <p:spPr>
+          <a:xfrm>
+            <a:off x="2312690" y="4886612"/>
+            <a:ext cx="571500" cy="369332"/>
+          </a:xfrm>
+          <a:prstGeom prst="rect">
+            <a:avLst/>
+          </a:prstGeom>
+          <a:noFill/>
+        </p:spPr>
+        <p:txBody>
+          <a:bodyPr wrap="square" rtlCol="0">
+            <a:spAutoFit/>
+          </a:bodyPr>
+          <a:lstStyle/>
+          <a:p>
+            <a:pPr algn="ctr"/>
+            <a:r>
+              <a:rPr lang="en-CA" dirty="0">
+                <a:latin typeface="Aptos" panose="020B0004020202020204" pitchFamily="34" charset="0"/>
+              </a:rPr>
+              <a:t>NO</a:t>
+            </a:r>
+          </a:p>
+        </p:txBody>
+      </p:sp>
+      <p:sp>
+        <p:nvSpPr>
+          <p:cNvPr id="21" name="TextBox 20">
+            <a:extLst>
+              <a:ext uri="{FF2B5EF4-FFF2-40B4-BE49-F238E27FC236}">
+                <a16:creationId xmlns:a16="http://schemas.microsoft.com/office/drawing/2014/main" id="{1B41C1A5-7FB0-77A5-C768-C126DA73C08A}"/>
+              </a:ext>
+            </a:extLst>
+          </p:cNvPr>
+          <p:cNvSpPr txBox="1"/>
+          <p:nvPr/>
+        </p:nvSpPr>
+        <p:spPr>
+          <a:xfrm>
+            <a:off x="4151232" y="3059724"/>
+            <a:ext cx="905715" cy="369332"/>
+          </a:xfrm>
+          <a:prstGeom prst="rect">
+            <a:avLst/>
+          </a:prstGeom>
+          <a:noFill/>
+        </p:spPr>
+        <p:txBody>
+          <a:bodyPr wrap="square" rtlCol="0">
+            <a:spAutoFit/>
+          </a:bodyPr>
+          <a:lstStyle/>
+          <a:p>
+            <a:pPr algn="ctr"/>
+            <a:r>
+              <a:rPr lang="en-CA" dirty="0">
+                <a:latin typeface="Aptos" panose="020B0004020202020204" pitchFamily="34" charset="0"/>
+              </a:rPr>
+              <a:t>YES</a:t>
+            </a:r>
+          </a:p>
+        </p:txBody>
+      </p:sp>
+      <p:sp>
+        <p:nvSpPr>
+          <p:cNvPr id="22" name="Arrow: Right 21">
+            <a:extLst>
+              <a:ext uri="{FF2B5EF4-FFF2-40B4-BE49-F238E27FC236}">
+                <a16:creationId xmlns:a16="http://schemas.microsoft.com/office/drawing/2014/main" id="{9CF7D71E-5CA9-AB83-DBFA-4C54D95B8332}"/>
+              </a:ext>
+            </a:extLst>
+          </p:cNvPr>
+          <p:cNvSpPr/>
+          <p:nvPr/>
+        </p:nvSpPr>
+        <p:spPr>
+          <a:xfrm>
+            <a:off x="4243605" y="3560885"/>
+            <a:ext cx="773723" cy="606669"/>
+          </a:xfrm>
+          <a:prstGeom prst="rightArrow">
+            <a:avLst/>
+          </a:prstGeom>
+          <a:ln>
+            <a:noFill/>
+          </a:ln>
+        </p:spPr>
+        <p:style>
+          <a:lnRef idx="2">
+            <a:schemeClr val="accent6">
+              <a:shade val="15000"/>
+            </a:schemeClr>
+          </a:lnRef>
+          <a:fillRef idx="1">
+            <a:schemeClr val="accent6"/>
+          </a:fillRef>
+          <a:effectRef idx="0">
+            <a:schemeClr val="accent6"/>
+          </a:effectRef>
+          <a:fontRef idx="minor">
+            <a:schemeClr val="lt1"/>
+          </a:fontRef>
+        </p:style>
+        <p:txBody>
+          <a:bodyPr rtlCol="0" anchor="ctr"/>
+          <a:lstStyle/>
+          <a:p>
+            <a:pPr algn="ctr"/>
+            <a:endParaRPr lang="en-CA"/>
+          </a:p>
+        </p:txBody>
+      </p:sp>
+      <p:sp>
+        <p:nvSpPr>
+          <p:cNvPr id="23" name="Rectangle: Rounded Corners 22">
+            <a:extLst>
+              <a:ext uri="{FF2B5EF4-FFF2-40B4-BE49-F238E27FC236}">
+                <a16:creationId xmlns:a16="http://schemas.microsoft.com/office/drawing/2014/main" id="{BBDE3298-85FF-1012-89F9-739DCD275A0F}"/>
+              </a:ext>
+            </a:extLst>
+          </p:cNvPr>
+          <p:cNvSpPr/>
+          <p:nvPr/>
+        </p:nvSpPr>
+        <p:spPr>
+          <a:xfrm>
+            <a:off x="2406166" y="5540390"/>
+            <a:ext cx="1737946" cy="1065806"/>
+          </a:xfrm>
+          <a:prstGeom prst="roundRect">
+            <a:avLst/>
+          </a:prstGeom>
+        </p:spPr>
+        <p:style>
+          <a:lnRef idx="2">
+            <a:schemeClr val="accent1">
+              <a:shade val="15000"/>
+            </a:schemeClr>
+          </a:lnRef>
+          <a:fillRef idx="1">
+            <a:schemeClr val="accent1"/>
+          </a:fillRef>
+          <a:effectRef idx="0">
+            <a:schemeClr val="accent1"/>
+          </a:effectRef>
+          <a:fontRef idx="minor">
+            <a:schemeClr val="lt1"/>
+          </a:fontRef>
+        </p:style>
+        <p:txBody>
+          <a:bodyPr rtlCol="0" anchor="ctr"/>
+          <a:lstStyle/>
+          <a:p>
+            <a:pPr algn="ctr"/>
+            <a:r>
+              <a:rPr lang="en-CA" b="1" dirty="0">
+                <a:latin typeface="Aptos" panose="020B0004020202020204" pitchFamily="34" charset="0"/>
+              </a:rPr>
+              <a:t>Create monthly database</a:t>
+            </a:r>
+          </a:p>
+        </p:txBody>
+      </p:sp>
+      <p:sp>
+        <p:nvSpPr>
+          <p:cNvPr id="24" name="Rectangle: Rounded Corners 23">
+            <a:extLst>
+              <a:ext uri="{FF2B5EF4-FFF2-40B4-BE49-F238E27FC236}">
+                <a16:creationId xmlns:a16="http://schemas.microsoft.com/office/drawing/2014/main" id="{6EBC2D21-2162-24B0-82C5-908D15FF68DB}"/>
+              </a:ext>
+            </a:extLst>
+          </p:cNvPr>
+          <p:cNvSpPr/>
+          <p:nvPr/>
+        </p:nvSpPr>
+        <p:spPr>
+          <a:xfrm>
+            <a:off x="5069974" y="3094890"/>
+            <a:ext cx="1737946" cy="1485900"/>
+          </a:xfrm>
+          <a:prstGeom prst="roundRect">
+            <a:avLst/>
+          </a:prstGeom>
+        </p:spPr>
+        <p:style>
+          <a:lnRef idx="2">
+            <a:schemeClr val="accent1">
+              <a:shade val="15000"/>
+            </a:schemeClr>
+          </a:lnRef>
+          <a:fillRef idx="1">
+            <a:schemeClr val="accent1"/>
+          </a:fillRef>
+          <a:effectRef idx="0">
+            <a:schemeClr val="accent1"/>
+          </a:effectRef>
+          <a:fontRef idx="minor">
+            <a:schemeClr val="lt1"/>
+          </a:fontRef>
+        </p:style>
+        <p:txBody>
+          <a:bodyPr rtlCol="0" anchor="ctr"/>
+          <a:lstStyle/>
+          <a:p>
+            <a:pPr algn="ctr"/>
+            <a:r>
+              <a:rPr lang="en-CA" b="1" dirty="0">
+                <a:latin typeface="Aptos" panose="020B0004020202020204" pitchFamily="34" charset="0"/>
+              </a:rPr>
+              <a:t>Copy diary template</a:t>
+            </a:r>
+          </a:p>
+        </p:txBody>
+      </p:sp>
+      <p:sp>
+        <p:nvSpPr>
+          <p:cNvPr id="25" name="Arrow: Bent-Up 24">
+            <a:extLst>
+              <a:ext uri="{FF2B5EF4-FFF2-40B4-BE49-F238E27FC236}">
+                <a16:creationId xmlns:a16="http://schemas.microsoft.com/office/drawing/2014/main" id="{8C8FEB69-CA9B-F15A-6F9F-546DB8176565}"/>
+              </a:ext>
+            </a:extLst>
+          </p:cNvPr>
+          <p:cNvSpPr/>
+          <p:nvPr/>
+        </p:nvSpPr>
+        <p:spPr>
+          <a:xfrm>
+            <a:off x="4337593" y="4763184"/>
+            <a:ext cx="1931322" cy="1485900"/>
+          </a:xfrm>
+          <a:prstGeom prst="bentUpArrow">
+            <a:avLst>
+              <a:gd name="adj1" fmla="val 25000"/>
+              <a:gd name="adj2" fmla="val 25000"/>
+              <a:gd name="adj3" fmla="val 26183"/>
+            </a:avLst>
+          </a:prstGeom>
+          <a:ln>
+            <a:noFill/>
+          </a:ln>
+        </p:spPr>
+        <p:style>
+          <a:lnRef idx="2">
+            <a:schemeClr val="accent1">
+              <a:shade val="15000"/>
+            </a:schemeClr>
+          </a:lnRef>
+          <a:fillRef idx="1">
+            <a:schemeClr val="accent1"/>
+          </a:fillRef>
+          <a:effectRef idx="0">
+            <a:schemeClr val="accent1"/>
+          </a:effectRef>
+          <a:fontRef idx="minor">
+            <a:schemeClr val="lt1"/>
+          </a:fontRef>
+        </p:style>
+        <p:txBody>
+          <a:bodyPr rtlCol="0" anchor="ctr"/>
+          <a:lstStyle/>
+          <a:p>
+            <a:pPr algn="ctr"/>
+            <a:endParaRPr lang="en-CA"/>
+          </a:p>
+        </p:txBody>
+      </p:sp>
+      <p:sp>
+        <p:nvSpPr>
+          <p:cNvPr id="3" name="Rectangle: Rounded Corners 2">
+            <a:extLst>
+              <a:ext uri="{FF2B5EF4-FFF2-40B4-BE49-F238E27FC236}">
+                <a16:creationId xmlns:a16="http://schemas.microsoft.com/office/drawing/2014/main" id="{23EFE4FF-38D6-2A9B-0C47-0B2FD8F4705A}"/>
+              </a:ext>
+            </a:extLst>
+          </p:cNvPr>
+          <p:cNvSpPr/>
+          <p:nvPr/>
+        </p:nvSpPr>
+        <p:spPr>
+          <a:xfrm>
+            <a:off x="7678143" y="3094890"/>
+            <a:ext cx="1737946" cy="1485900"/>
+          </a:xfrm>
+          <a:prstGeom prst="roundRect">
+            <a:avLst/>
+          </a:prstGeom>
+        </p:spPr>
+        <p:style>
+          <a:lnRef idx="2">
+            <a:schemeClr val="accent1">
+              <a:shade val="15000"/>
+            </a:schemeClr>
+          </a:lnRef>
+          <a:fillRef idx="1">
+            <a:schemeClr val="accent1"/>
+          </a:fillRef>
+          <a:effectRef idx="0">
+            <a:schemeClr val="accent1"/>
+          </a:effectRef>
+          <a:fontRef idx="minor">
+            <a:schemeClr val="lt1"/>
+          </a:fontRef>
+        </p:style>
+        <p:txBody>
+          <a:bodyPr rtlCol="0" anchor="ctr"/>
+          <a:lstStyle/>
+          <a:p>
+            <a:pPr algn="ctr"/>
+            <a:r>
+              <a:rPr lang="en-CA" b="1" dirty="0">
+                <a:latin typeface="Aptos" panose="020B0004020202020204" pitchFamily="34" charset="0"/>
+              </a:rPr>
+              <a:t>Check events from Google Calendar</a:t>
+            </a:r>
+          </a:p>
+        </p:txBody>
+      </p:sp>
+      <p:sp>
+        <p:nvSpPr>
+          <p:cNvPr id="4" name="Arrow: Right 3">
+            <a:extLst>
+              <a:ext uri="{FF2B5EF4-FFF2-40B4-BE49-F238E27FC236}">
+                <a16:creationId xmlns:a16="http://schemas.microsoft.com/office/drawing/2014/main" id="{A5BF445E-789E-ED77-A7C5-AC1A8CD3D8B5}"/>
+              </a:ext>
+            </a:extLst>
+          </p:cNvPr>
+          <p:cNvSpPr/>
+          <p:nvPr/>
+        </p:nvSpPr>
+        <p:spPr>
+          <a:xfrm>
+            <a:off x="6878150" y="3560885"/>
+            <a:ext cx="773723" cy="606669"/>
+          </a:xfrm>
+          <a:prstGeom prst="rightArrow">
+            <a:avLst/>
+          </a:prstGeom>
+          <a:ln>
+            <a:noFill/>
+          </a:ln>
+        </p:spPr>
+        <p:style>
+          <a:lnRef idx="2">
+            <a:schemeClr val="accent1">
+              <a:shade val="15000"/>
+            </a:schemeClr>
+          </a:lnRef>
+          <a:fillRef idx="1">
+            <a:schemeClr val="accent1"/>
+          </a:fillRef>
+          <a:effectRef idx="0">
+            <a:schemeClr val="accent1"/>
+          </a:effectRef>
+          <a:fontRef idx="minor">
+            <a:schemeClr val="lt1"/>
+          </a:fontRef>
+        </p:style>
+        <p:txBody>
+          <a:bodyPr rtlCol="0" anchor="ctr"/>
+          <a:lstStyle/>
+          <a:p>
+            <a:pPr algn="ctr"/>
+            <a:endParaRPr lang="en-CA"/>
+          </a:p>
+        </p:txBody>
+      </p:sp>
+      <p:sp>
+        <p:nvSpPr>
+          <p:cNvPr id="5" name="Rectangle: Rounded Corners 4">
+            <a:extLst>
+              <a:ext uri="{FF2B5EF4-FFF2-40B4-BE49-F238E27FC236}">
+                <a16:creationId xmlns:a16="http://schemas.microsoft.com/office/drawing/2014/main" id="{2C88AEDB-2A12-22F9-29B2-9552CEA06DD9}"/>
+              </a:ext>
+            </a:extLst>
+          </p:cNvPr>
+          <p:cNvSpPr/>
+          <p:nvPr/>
+        </p:nvSpPr>
+        <p:spPr>
+          <a:xfrm>
+            <a:off x="10262081" y="3094890"/>
+            <a:ext cx="1737946" cy="1485900"/>
+          </a:xfrm>
+          <a:prstGeom prst="roundRect">
+            <a:avLst/>
+          </a:prstGeom>
+        </p:spPr>
+        <p:style>
+          <a:lnRef idx="2">
+            <a:schemeClr val="accent1">
+              <a:shade val="15000"/>
+            </a:schemeClr>
+          </a:lnRef>
+          <a:fillRef idx="1">
+            <a:schemeClr val="accent1"/>
+          </a:fillRef>
+          <a:effectRef idx="0">
+            <a:schemeClr val="accent1"/>
+          </a:effectRef>
+          <a:fontRef idx="minor">
+            <a:schemeClr val="lt1"/>
+          </a:fontRef>
+        </p:style>
+        <p:txBody>
+          <a:bodyPr rtlCol="0" anchor="ctr"/>
+          <a:lstStyle/>
+          <a:p>
+            <a:pPr algn="ctr"/>
+            <a:r>
+              <a:rPr lang="en-CA" b="1" dirty="0">
+                <a:latin typeface="Aptos" panose="020B0004020202020204" pitchFamily="34" charset="0"/>
+              </a:rPr>
+              <a:t>Check if daily diary document exists</a:t>
+            </a:r>
+          </a:p>
+        </p:txBody>
+      </p:sp>
+      <p:sp>
+        <p:nvSpPr>
+          <p:cNvPr id="6" name="Arrow: Right 5">
+            <a:extLst>
+              <a:ext uri="{FF2B5EF4-FFF2-40B4-BE49-F238E27FC236}">
+                <a16:creationId xmlns:a16="http://schemas.microsoft.com/office/drawing/2014/main" id="{7EF55DB1-DA12-4747-5D4D-029F50CBE0D4}"/>
+              </a:ext>
+            </a:extLst>
+          </p:cNvPr>
+          <p:cNvSpPr/>
+          <p:nvPr/>
+        </p:nvSpPr>
+        <p:spPr>
+          <a:xfrm>
+            <a:off x="9468629" y="3560885"/>
+            <a:ext cx="773723" cy="606669"/>
+          </a:xfrm>
+          <a:prstGeom prst="rightArrow">
+            <a:avLst/>
+          </a:prstGeom>
+          <a:ln>
+            <a:noFill/>
+          </a:ln>
+        </p:spPr>
+        <p:style>
+          <a:lnRef idx="2">
+            <a:schemeClr val="accent1">
+              <a:shade val="15000"/>
+            </a:schemeClr>
+          </a:lnRef>
+          <a:fillRef idx="1">
+            <a:schemeClr val="accent1"/>
+          </a:fillRef>
+          <a:effectRef idx="0">
+            <a:schemeClr val="accent1"/>
+          </a:effectRef>
+          <a:fontRef idx="minor">
+            <a:schemeClr val="lt1"/>
+          </a:fontRef>
+        </p:style>
+        <p:txBody>
+          <a:bodyPr rtlCol="0" anchor="ctr"/>
+          <a:lstStyle/>
+          <a:p>
+            <a:pPr algn="ctr"/>
+            <a:endParaRPr lang="en-CA"/>
+          </a:p>
+        </p:txBody>
+      </p:sp>
+      <p:sp>
+        <p:nvSpPr>
+          <p:cNvPr id="7" name="Arrow: Down 6">
+            <a:extLst>
+              <a:ext uri="{FF2B5EF4-FFF2-40B4-BE49-F238E27FC236}">
+                <a16:creationId xmlns:a16="http://schemas.microsoft.com/office/drawing/2014/main" id="{8C537069-3E37-8AD6-EC37-B591E7076D14}"/>
+              </a:ext>
+            </a:extLst>
+          </p:cNvPr>
+          <p:cNvSpPr/>
+          <p:nvPr/>
+        </p:nvSpPr>
+        <p:spPr>
+          <a:xfrm>
+            <a:off x="10782300" y="4719586"/>
+            <a:ext cx="571500" cy="703385"/>
+          </a:xfrm>
+          <a:prstGeom prst="downArrow">
+            <a:avLst/>
+          </a:prstGeom>
+          <a:solidFill>
+            <a:srgbClr val="C00000"/>
+          </a:solidFill>
+          <a:ln>
+            <a:noFill/>
+          </a:ln>
+        </p:spPr>
+        <p:style>
+          <a:lnRef idx="2">
+            <a:schemeClr val="accent1">
+              <a:shade val="15000"/>
+            </a:schemeClr>
+          </a:lnRef>
+          <a:fillRef idx="1">
+            <a:schemeClr val="accent1"/>
+          </a:fillRef>
+          <a:effectRef idx="0">
+            <a:schemeClr val="accent1"/>
+          </a:effectRef>
+          <a:fontRef idx="minor">
+            <a:schemeClr val="lt1"/>
+          </a:fontRef>
+        </p:style>
+        <p:txBody>
+          <a:bodyPr rtlCol="0" anchor="ctr"/>
+          <a:lstStyle/>
+          <a:p>
+            <a:pPr algn="ctr"/>
+            <a:endParaRPr lang="en-CA"/>
+          </a:p>
+        </p:txBody>
+      </p:sp>
+      <p:sp>
+        <p:nvSpPr>
+          <p:cNvPr id="8" name="TextBox 7">
+            <a:extLst>
+              <a:ext uri="{FF2B5EF4-FFF2-40B4-BE49-F238E27FC236}">
+                <a16:creationId xmlns:a16="http://schemas.microsoft.com/office/drawing/2014/main" id="{73CB6C80-5F23-27B5-621B-0B256F853A80}"/>
+              </a:ext>
+            </a:extLst>
+          </p:cNvPr>
+          <p:cNvSpPr txBox="1"/>
+          <p:nvPr/>
+        </p:nvSpPr>
+        <p:spPr>
+          <a:xfrm>
+            <a:off x="10105601" y="4886612"/>
+            <a:ext cx="571500" cy="369332"/>
+          </a:xfrm>
+          <a:prstGeom prst="rect">
+            <a:avLst/>
+          </a:prstGeom>
+          <a:noFill/>
+        </p:spPr>
+        <p:txBody>
+          <a:bodyPr wrap="square" rtlCol="0">
+            <a:spAutoFit/>
+          </a:bodyPr>
+          <a:lstStyle/>
+          <a:p>
+            <a:pPr algn="ctr"/>
+            <a:r>
+              <a:rPr lang="en-CA" dirty="0">
+                <a:latin typeface="Aptos" panose="020B0004020202020204" pitchFamily="34" charset="0"/>
+              </a:rPr>
+              <a:t>NO</a:t>
+            </a:r>
+          </a:p>
+        </p:txBody>
+      </p:sp>
+      <p:sp>
+        <p:nvSpPr>
+          <p:cNvPr id="9" name="Rectangle: Rounded Corners 8">
+            <a:extLst>
+              <a:ext uri="{FF2B5EF4-FFF2-40B4-BE49-F238E27FC236}">
+                <a16:creationId xmlns:a16="http://schemas.microsoft.com/office/drawing/2014/main" id="{4A1C84FF-563B-41CC-B321-0900CE3A4440}"/>
+              </a:ext>
+            </a:extLst>
+          </p:cNvPr>
+          <p:cNvSpPr/>
+          <p:nvPr/>
+        </p:nvSpPr>
+        <p:spPr>
+          <a:xfrm>
+            <a:off x="10199077" y="5540390"/>
+            <a:ext cx="1737946" cy="1065806"/>
+          </a:xfrm>
+          <a:prstGeom prst="roundRect">
+            <a:avLst/>
+          </a:prstGeom>
+        </p:spPr>
+        <p:style>
+          <a:lnRef idx="2">
+            <a:schemeClr val="accent1">
+              <a:shade val="15000"/>
+            </a:schemeClr>
+          </a:lnRef>
+          <a:fillRef idx="1">
+            <a:schemeClr val="accent1"/>
+          </a:fillRef>
+          <a:effectRef idx="0">
+            <a:schemeClr val="accent1"/>
+          </a:effectRef>
+          <a:fontRef idx="minor">
+            <a:schemeClr val="lt1"/>
+          </a:fontRef>
+        </p:style>
+        <p:txBody>
+          <a:bodyPr rtlCol="0" anchor="ctr"/>
+          <a:lstStyle/>
+          <a:p>
+            <a:pPr algn="ctr"/>
+            <a:r>
+              <a:rPr lang="en-CA" b="1" dirty="0">
+                <a:latin typeface="Aptos" panose="020B0004020202020204" pitchFamily="34" charset="0"/>
+              </a:rPr>
+              <a:t>Create daily diary document</a:t>
+            </a:r>
+          </a:p>
+        </p:txBody>
+      </p:sp>
+    </p:spTree>
+    <p:extLst>
+      <p:ext uri="{BB962C8B-B14F-4D97-AF65-F5344CB8AC3E}">
+        <p14:creationId xmlns:p14="http://schemas.microsoft.com/office/powerpoint/2010/main" val="2602476562"/>
+      </p:ext>
+    </p:extLst>
+  </p:cSld>
+  <p:clrMapOvr>
+    <a:masterClrMapping/>
+  </p:clrMapOvr>
+</p:sld>
+</file>
+
+<file path=ppt/slides/slide6.xml><?xml version="1.0" encoding="utf-8"?>
 <p:sld xmlns:a="http://schemas.openxmlformats.org/drawingml/2006/main" xmlns:r="http://schemas.openxmlformats.org/officeDocument/2006/relationships" xmlns:p="http://schemas.openxmlformats.org/presentationml/2006/main">
   <p:cSld>
     <p:spTree>
@@ -4269,40 +5277,10 @@
       </p:grpSpPr>
       <p:sp>
         <p:nvSpPr>
-          <p:cNvPr id="2" name="Title 1">
-            <a:extLst>
-              <a:ext uri="{FF2B5EF4-FFF2-40B4-BE49-F238E27FC236}">
-                <a16:creationId xmlns:a16="http://schemas.microsoft.com/office/drawing/2014/main" id="{E11BB9E5-DA2D-2B34-B5C6-E2FF1A8C3E73}"/>
-              </a:ext>
-            </a:extLst>
-          </p:cNvPr>
-          <p:cNvSpPr>
-            <a:spLocks noGrp="1"/>
-          </p:cNvSpPr>
-          <p:nvPr>
-            <p:ph type="title"/>
-          </p:nvPr>
-        </p:nvSpPr>
-        <p:spPr/>
-        <p:txBody>
-          <a:bodyPr/>
-          <a:lstStyle/>
-          <a:p>
-            <a:r>
-              <a:rPr lang="en-CA" dirty="0">
-                <a:latin typeface="Aptos" panose="020B0004020202020204" pitchFamily="34" charset="0"/>
-              </a:rPr>
-              <a:t>Project Flow</a:t>
-            </a:r>
-          </a:p>
-        </p:txBody>
-      </p:sp>
-      <p:sp>
-        <p:nvSpPr>
-          <p:cNvPr id="12" name="Rectangle: Rounded Corners 11">
-            <a:extLst>
-              <a:ext uri="{FF2B5EF4-FFF2-40B4-BE49-F238E27FC236}">
-                <a16:creationId xmlns:a16="http://schemas.microsoft.com/office/drawing/2014/main" id="{52137374-F8BA-0FBA-24B7-84247E849BA3}"/>
+          <p:cNvPr id="80" name="Rectangle: Rounded Corners 79">
+            <a:extLst>
+              <a:ext uri="{FF2B5EF4-FFF2-40B4-BE49-F238E27FC236}">
+                <a16:creationId xmlns:a16="http://schemas.microsoft.com/office/drawing/2014/main" id="{262B5298-4570-8A72-A089-C8CDE3E1C564}"/>
               </a:ext>
             </a:extLst>
           </p:cNvPr>
@@ -4311,8 +5289,54 @@
         </p:nvSpPr>
         <p:spPr>
           <a:xfrm>
-            <a:off x="126024" y="3094891"/>
-            <a:ext cx="1354015" cy="1485900"/>
+            <a:off x="2807452" y="4577742"/>
+            <a:ext cx="3103058" cy="1259317"/>
+          </a:xfrm>
+          <a:prstGeom prst="roundRect">
+            <a:avLst/>
+          </a:prstGeom>
+        </p:spPr>
+        <p:style>
+          <a:lnRef idx="2">
+            <a:schemeClr val="accent4">
+              <a:shade val="15000"/>
+            </a:schemeClr>
+          </a:lnRef>
+          <a:fillRef idx="1">
+            <a:schemeClr val="accent4"/>
+          </a:fillRef>
+          <a:effectRef idx="0">
+            <a:schemeClr val="accent4"/>
+          </a:effectRef>
+          <a:fontRef idx="minor">
+            <a:schemeClr val="lt1"/>
+          </a:fontRef>
+        </p:style>
+        <p:txBody>
+          <a:bodyPr rtlCol="0" anchor="ctr"/>
+          <a:lstStyle/>
+          <a:p>
+            <a:pPr algn="ctr"/>
+            <a:endParaRPr lang="en-CA"/>
+          </a:p>
+        </p:txBody>
+      </p:sp>
+      <p:sp>
+        <p:nvSpPr>
+          <p:cNvPr id="23" name="Rectangle: Rounded Corners 22">
+            <a:extLst>
+              <a:ext uri="{FF2B5EF4-FFF2-40B4-BE49-F238E27FC236}">
+                <a16:creationId xmlns:a16="http://schemas.microsoft.com/office/drawing/2014/main" id="{82967F9D-BD4D-F08E-07C7-9E1B543FBD09}"/>
+              </a:ext>
+            </a:extLst>
+          </p:cNvPr>
+          <p:cNvSpPr/>
+          <p:nvPr/>
+        </p:nvSpPr>
+        <p:spPr>
+          <a:xfrm>
+            <a:off x="1028166" y="959049"/>
+            <a:ext cx="1148860" cy="1178171"/>
           </a:xfrm>
           <a:prstGeom prst="roundRect">
             <a:avLst/>
@@ -4340,20 +5364,20 @@
           <a:p>
             <a:pPr algn="ctr"/>
             <a:r>
-              <a:rPr lang="en-CA" b="1" dirty="0">
+              <a:rPr lang="en-CA" sz="1500" b="1" dirty="0">
                 <a:latin typeface="Aptos" panose="020B0004020202020204" pitchFamily="34" charset="0"/>
               </a:rPr>
-              <a:t>Check out date</a:t>
-            </a:r>
-          </a:p>
-        </p:txBody>
-      </p:sp>
-      <p:sp>
-        <p:nvSpPr>
-          <p:cNvPr id="13" name="Rectangle: Rounded Corners 12">
-            <a:extLst>
-              <a:ext uri="{FF2B5EF4-FFF2-40B4-BE49-F238E27FC236}">
-                <a16:creationId xmlns:a16="http://schemas.microsoft.com/office/drawing/2014/main" id="{03281E48-023C-C1C1-8B3A-814660E4DDFE}"/>
+              <a:t>Check out today’s date</a:t>
+            </a:r>
+          </a:p>
+        </p:txBody>
+      </p:sp>
+      <p:sp>
+        <p:nvSpPr>
+          <p:cNvPr id="45" name="Rectangle: Rounded Corners 44">
+            <a:extLst>
+              <a:ext uri="{FF2B5EF4-FFF2-40B4-BE49-F238E27FC236}">
+                <a16:creationId xmlns:a16="http://schemas.microsoft.com/office/drawing/2014/main" id="{43A67365-78A6-5D81-54D0-90D63065C734}"/>
               </a:ext>
             </a:extLst>
           </p:cNvPr>
@@ -4362,12 +5386,66 @@
         </p:nvSpPr>
         <p:spPr>
           <a:xfrm>
-            <a:off x="2406166" y="3094891"/>
-            <a:ext cx="1737946" cy="1485900"/>
+            <a:off x="2878945" y="959046"/>
+            <a:ext cx="1148860" cy="1178171"/>
           </a:xfrm>
           <a:prstGeom prst="roundRect">
             <a:avLst/>
           </a:prstGeom>
+        </p:spPr>
+        <p:style>
+          <a:lnRef idx="2">
+            <a:schemeClr val="accent5">
+              <a:shade val="15000"/>
+            </a:schemeClr>
+          </a:lnRef>
+          <a:fillRef idx="1">
+            <a:schemeClr val="accent5"/>
+          </a:fillRef>
+          <a:effectRef idx="0">
+            <a:schemeClr val="accent5"/>
+          </a:effectRef>
+          <a:fontRef idx="minor">
+            <a:schemeClr val="lt1"/>
+          </a:fontRef>
+        </p:style>
+        <p:txBody>
+          <a:bodyPr rtlCol="0" anchor="ctr"/>
+          <a:lstStyle/>
+          <a:p>
+            <a:pPr algn="ctr"/>
+            <a:r>
+              <a:rPr lang="en-CA" sz="1500" b="1" dirty="0">
+                <a:latin typeface="Aptos" panose="020B0004020202020204" pitchFamily="34" charset="0"/>
+              </a:rPr>
+              <a:t>Check if monthly database exists</a:t>
+            </a:r>
+          </a:p>
+        </p:txBody>
+      </p:sp>
+      <p:sp>
+        <p:nvSpPr>
+          <p:cNvPr id="46" name="Arrow: Right 45">
+            <a:extLst>
+              <a:ext uri="{FF2B5EF4-FFF2-40B4-BE49-F238E27FC236}">
+                <a16:creationId xmlns:a16="http://schemas.microsoft.com/office/drawing/2014/main" id="{949E19BB-A214-E6EC-2705-C189A7A9C27B}"/>
+              </a:ext>
+            </a:extLst>
+          </p:cNvPr>
+          <p:cNvSpPr/>
+          <p:nvPr/>
+        </p:nvSpPr>
+        <p:spPr>
+          <a:xfrm>
+            <a:off x="2272276" y="1374486"/>
+            <a:ext cx="511419" cy="347293"/>
+          </a:xfrm>
+          <a:prstGeom prst="rightArrow">
+            <a:avLst/>
+          </a:prstGeom>
+          <a:ln>
+            <a:noFill/>
+          </a:ln>
         </p:spPr>
         <p:style>
           <a:lnRef idx="2">
@@ -4390,21 +5468,16 @@
           <a:lstStyle/>
           <a:p>
             <a:pPr algn="ctr"/>
-            <a:r>
-              <a:rPr lang="en-CA" b="1" dirty="0">
-                <a:latin typeface="Aptos" panose="020B0004020202020204" pitchFamily="34" charset="0"/>
-              </a:rPr>
-              <a:t>Check if monthly database exists</a:t>
-            </a:r>
-          </a:p>
-        </p:txBody>
-      </p:sp>
-      <p:sp>
-        <p:nvSpPr>
-          <p:cNvPr id="14" name="Arrow: Right 13">
-            <a:extLst>
-              <a:ext uri="{FF2B5EF4-FFF2-40B4-BE49-F238E27FC236}">
-                <a16:creationId xmlns:a16="http://schemas.microsoft.com/office/drawing/2014/main" id="{AA106134-0B03-F90E-4D22-DA6E40ABE301}"/>
+            <a:endParaRPr lang="en-CA"/>
+          </a:p>
+        </p:txBody>
+      </p:sp>
+      <p:sp>
+        <p:nvSpPr>
+          <p:cNvPr id="47" name="Arrow: Right 46">
+            <a:extLst>
+              <a:ext uri="{FF2B5EF4-FFF2-40B4-BE49-F238E27FC236}">
+                <a16:creationId xmlns:a16="http://schemas.microsoft.com/office/drawing/2014/main" id="{AD6F688F-289E-3213-2284-4F67B0C660DD}"/>
               </a:ext>
             </a:extLst>
           </p:cNvPr>
@@ -4413,12 +5486,64 @@
         </p:nvSpPr>
         <p:spPr>
           <a:xfrm>
-            <a:off x="1560639" y="3534506"/>
-            <a:ext cx="773723" cy="606669"/>
+            <a:off x="4123055" y="1342064"/>
+            <a:ext cx="471855" cy="412134"/>
           </a:xfrm>
           <a:prstGeom prst="rightArrow">
             <a:avLst/>
           </a:prstGeom>
+          <a:ln>
+            <a:noFill/>
+          </a:ln>
+        </p:spPr>
+        <p:style>
+          <a:lnRef idx="2">
+            <a:schemeClr val="accent6">
+              <a:shade val="15000"/>
+            </a:schemeClr>
+          </a:lnRef>
+          <a:fillRef idx="1">
+            <a:schemeClr val="accent6"/>
+          </a:fillRef>
+          <a:effectRef idx="0">
+            <a:schemeClr val="accent6"/>
+          </a:effectRef>
+          <a:fontRef idx="minor">
+            <a:schemeClr val="lt1"/>
+          </a:fontRef>
+        </p:style>
+        <p:txBody>
+          <a:bodyPr rtlCol="0" anchor="ctr"/>
+          <a:lstStyle/>
+          <a:p>
+            <a:pPr algn="ctr"/>
+            <a:endParaRPr lang="en-CA"/>
+          </a:p>
+        </p:txBody>
+      </p:sp>
+      <p:sp>
+        <p:nvSpPr>
+          <p:cNvPr id="48" name="Arrow: Down 47">
+            <a:extLst>
+              <a:ext uri="{FF2B5EF4-FFF2-40B4-BE49-F238E27FC236}">
+                <a16:creationId xmlns:a16="http://schemas.microsoft.com/office/drawing/2014/main" id="{FAD58D4B-80F1-D7F9-D41B-ADFC0FC8BEAB}"/>
+              </a:ext>
+            </a:extLst>
+          </p:cNvPr>
+          <p:cNvSpPr/>
+          <p:nvPr/>
+        </p:nvSpPr>
+        <p:spPr>
+          <a:xfrm>
+            <a:off x="3249686" y="2223261"/>
+            <a:ext cx="407377" cy="485459"/>
+          </a:xfrm>
+          <a:prstGeom prst="downArrow">
+            <a:avLst/>
+          </a:prstGeom>
+          <a:solidFill>
+            <a:srgbClr val="C00000"/>
+          </a:solidFill>
           <a:ln>
             <a:noFill/>
           </a:ln>
@@ -4450,153 +5575,24 @@
       </p:sp>
       <p:sp>
         <p:nvSpPr>
-          <p:cNvPr id="15" name="TextBox 14">
-            <a:extLst>
-              <a:ext uri="{FF2B5EF4-FFF2-40B4-BE49-F238E27FC236}">
-                <a16:creationId xmlns:a16="http://schemas.microsoft.com/office/drawing/2014/main" id="{AC5C79EC-71EC-BC17-7B05-C5B1C81D45E5}"/>
-              </a:ext>
-            </a:extLst>
-          </p:cNvPr>
-          <p:cNvSpPr txBox="1"/>
+          <p:cNvPr id="49" name="Rectangle: Rounded Corners 48">
+            <a:extLst>
+              <a:ext uri="{FF2B5EF4-FFF2-40B4-BE49-F238E27FC236}">
+                <a16:creationId xmlns:a16="http://schemas.microsoft.com/office/drawing/2014/main" id="{7D58FFBD-00DC-50FD-3A30-ED81D60EF68B}"/>
+              </a:ext>
+            </a:extLst>
+          </p:cNvPr>
+          <p:cNvSpPr/>
           <p:nvPr/>
         </p:nvSpPr>
         <p:spPr>
           <a:xfrm>
-            <a:off x="1468266" y="2826629"/>
-            <a:ext cx="905715" cy="646331"/>
-          </a:xfrm>
-          <a:prstGeom prst="rect">
+            <a:off x="4690160" y="959045"/>
+            <a:ext cx="1148860" cy="1178171"/>
+          </a:xfrm>
+          <a:prstGeom prst="roundRect">
             <a:avLst/>
           </a:prstGeom>
-          <a:noFill/>
-        </p:spPr>
-        <p:txBody>
-          <a:bodyPr wrap="square" rtlCol="0">
-            <a:spAutoFit/>
-          </a:bodyPr>
-          <a:lstStyle/>
-          <a:p>
-            <a:pPr algn="ctr"/>
-            <a:r>
-              <a:rPr lang="en-CA" dirty="0">
-                <a:latin typeface="Aptos" panose="020B0004020202020204" pitchFamily="34" charset="0"/>
-              </a:rPr>
-              <a:t>07/24/2023</a:t>
-            </a:r>
-          </a:p>
-        </p:txBody>
-      </p:sp>
-      <p:pic>
-        <p:nvPicPr>
-          <p:cNvPr id="16" name="Picture 4" descr="upload.wikimedia.org/wikipedia/commons/4/45/Not...">
-            <a:extLst>
-              <a:ext uri="{FF2B5EF4-FFF2-40B4-BE49-F238E27FC236}">
-                <a16:creationId xmlns:a16="http://schemas.microsoft.com/office/drawing/2014/main" id="{F48D579E-00EF-F565-13E6-3BC15E5B22F7}"/>
-              </a:ext>
-            </a:extLst>
-          </p:cNvPr>
-          <p:cNvPicPr>
-            <a:picLocks noChangeAspect="1" noChangeArrowheads="1"/>
-          </p:cNvPicPr>
-          <p:nvPr/>
-        </p:nvPicPr>
-        <p:blipFill>
-          <a:blip r:embed="rId2">
-            <a:extLst>
-              <a:ext uri="{28A0092B-C50C-407E-A947-70E740481C1C}">
-                <a14:useLocalDpi xmlns:a14="http://schemas.microsoft.com/office/drawing/2010/main" val="0"/>
-              </a:ext>
-            </a:extLst>
-          </a:blip>
-          <a:srcRect/>
-          <a:stretch>
-            <a:fillRect/>
-          </a:stretch>
-        </p:blipFill>
-        <p:spPr bwMode="auto">
-          <a:xfrm>
-            <a:off x="2884190" y="1575703"/>
-            <a:ext cx="811311" cy="811311"/>
-          </a:xfrm>
-          <a:prstGeom prst="rect">
-            <a:avLst/>
-          </a:prstGeom>
-          <a:noFill/>
-          <a:extLst>
-            <a:ext uri="{909E8E84-426E-40DD-AFC4-6F175D3DCCD1}">
-              <a14:hiddenFill xmlns:a14="http://schemas.microsoft.com/office/drawing/2010/main">
-                <a:solidFill>
-                  <a:srgbClr val="FFFFFF"/>
-                </a:solidFill>
-              </a14:hiddenFill>
-            </a:ext>
-          </a:extLst>
-        </p:spPr>
-      </p:pic>
-      <p:sp>
-        <p:nvSpPr>
-          <p:cNvPr id="17" name="TextBox 16">
-            <a:extLst>
-              <a:ext uri="{FF2B5EF4-FFF2-40B4-BE49-F238E27FC236}">
-                <a16:creationId xmlns:a16="http://schemas.microsoft.com/office/drawing/2014/main" id="{B0473DFF-2D07-E9F6-DA42-33F305F4B572}"/>
-              </a:ext>
-            </a:extLst>
-          </p:cNvPr>
-          <p:cNvSpPr txBox="1"/>
-          <p:nvPr/>
-        </p:nvSpPr>
-        <p:spPr>
-          <a:xfrm>
-            <a:off x="2250889" y="2387014"/>
-            <a:ext cx="2077915" cy="646331"/>
-          </a:xfrm>
-          <a:prstGeom prst="rect">
-            <a:avLst/>
-          </a:prstGeom>
-          <a:noFill/>
-        </p:spPr>
-        <p:txBody>
-          <a:bodyPr wrap="square" rtlCol="0">
-            <a:spAutoFit/>
-          </a:bodyPr>
-          <a:lstStyle/>
-          <a:p>
-            <a:pPr algn="ctr"/>
-            <a:r>
-              <a:rPr lang="en-CA" dirty="0">
-                <a:latin typeface="Aptos" panose="020B0004020202020204" pitchFamily="34" charset="0"/>
-              </a:rPr>
-              <a:t>Does “July 2023” database exist?</a:t>
-            </a:r>
-          </a:p>
-        </p:txBody>
-      </p:sp>
-      <p:sp>
-        <p:nvSpPr>
-          <p:cNvPr id="18" name="Arrow: Down 17">
-            <a:extLst>
-              <a:ext uri="{FF2B5EF4-FFF2-40B4-BE49-F238E27FC236}">
-                <a16:creationId xmlns:a16="http://schemas.microsoft.com/office/drawing/2014/main" id="{72445445-A3BA-0E8F-6C77-B37B4AFB42F9}"/>
-              </a:ext>
-            </a:extLst>
-          </p:cNvPr>
-          <p:cNvSpPr/>
-          <p:nvPr/>
-        </p:nvSpPr>
-        <p:spPr>
-          <a:xfrm>
-            <a:off x="2989389" y="4719586"/>
-            <a:ext cx="571500" cy="703385"/>
-          </a:xfrm>
-          <a:prstGeom prst="downArrow">
-            <a:avLst/>
-          </a:prstGeom>
-          <a:solidFill>
-            <a:srgbClr val="C00000"/>
-          </a:solidFill>
-          <a:ln>
-            <a:noFill/>
-          </a:ln>
         </p:spPr>
         <p:style>
           <a:lnRef idx="2">
@@ -4619,16 +5615,21 @@
           <a:lstStyle/>
           <a:p>
             <a:pPr algn="ctr"/>
-            <a:endParaRPr lang="en-CA"/>
-          </a:p>
-        </p:txBody>
-      </p:sp>
-      <p:sp>
-        <p:nvSpPr>
-          <p:cNvPr id="19" name="TextBox 18">
-            <a:extLst>
-              <a:ext uri="{FF2B5EF4-FFF2-40B4-BE49-F238E27FC236}">
-                <a16:creationId xmlns:a16="http://schemas.microsoft.com/office/drawing/2014/main" id="{1D3C81CF-1177-96CE-8E48-390D25988D5A}"/>
+            <a:r>
+              <a:rPr lang="en-CA" sz="1500" b="1" dirty="0">
+                <a:latin typeface="Aptos" panose="020B0004020202020204" pitchFamily="34" charset="0"/>
+              </a:rPr>
+              <a:t>Retrieve diary template</a:t>
+            </a:r>
+          </a:p>
+        </p:txBody>
+      </p:sp>
+      <p:sp>
+        <p:nvSpPr>
+          <p:cNvPr id="50" name="TextBox 49">
+            <a:extLst>
+              <a:ext uri="{FF2B5EF4-FFF2-40B4-BE49-F238E27FC236}">
+                <a16:creationId xmlns:a16="http://schemas.microsoft.com/office/drawing/2014/main" id="{A499183D-A467-3E05-2825-A619A8AA74A8}"/>
               </a:ext>
             </a:extLst>
           </p:cNvPr>
@@ -4637,8 +5638,8 @@
         </p:nvSpPr>
         <p:spPr>
           <a:xfrm>
-            <a:off x="2312690" y="4886612"/>
-            <a:ext cx="571500" cy="369332"/>
+            <a:off x="2831212" y="2304407"/>
+            <a:ext cx="474472" cy="323165"/>
           </a:xfrm>
           <a:prstGeom prst="rect">
             <a:avLst/>
@@ -4653,7 +5654,7 @@
           <a:p>
             <a:pPr algn="ctr"/>
             <a:r>
-              <a:rPr lang="en-CA" dirty="0">
+              <a:rPr lang="en-CA" sz="1500" dirty="0">
                 <a:latin typeface="Aptos" panose="020B0004020202020204" pitchFamily="34" charset="0"/>
               </a:rPr>
               <a:t>NO</a:t>
@@ -4663,10 +5664,10 @@
       </p:sp>
       <p:sp>
         <p:nvSpPr>
-          <p:cNvPr id="21" name="TextBox 20">
-            <a:extLst>
-              <a:ext uri="{FF2B5EF4-FFF2-40B4-BE49-F238E27FC236}">
-                <a16:creationId xmlns:a16="http://schemas.microsoft.com/office/drawing/2014/main" id="{1B41C1A5-7FB0-77A5-C768-C126DA73C08A}"/>
+          <p:cNvPr id="51" name="TextBox 50">
+            <a:extLst>
+              <a:ext uri="{FF2B5EF4-FFF2-40B4-BE49-F238E27FC236}">
+                <a16:creationId xmlns:a16="http://schemas.microsoft.com/office/drawing/2014/main" id="{B16B437D-7D7E-DB52-5446-8ED272AD82DD}"/>
               </a:ext>
             </a:extLst>
           </p:cNvPr>
@@ -4675,8 +5676,8 @@
         </p:nvSpPr>
         <p:spPr>
           <a:xfrm>
-            <a:off x="4151232" y="3059724"/>
-            <a:ext cx="905715" cy="369332"/>
+            <a:off x="4061401" y="959045"/>
+            <a:ext cx="533509" cy="323165"/>
           </a:xfrm>
           <a:prstGeom prst="rect">
             <a:avLst/>
@@ -4691,7 +5692,7 @@
           <a:p>
             <a:pPr algn="ctr"/>
             <a:r>
-              <a:rPr lang="en-CA" dirty="0">
+              <a:rPr lang="en-CA" sz="1500" dirty="0">
                 <a:latin typeface="Aptos" panose="020B0004020202020204" pitchFamily="34" charset="0"/>
               </a:rPr>
               <a:t>YES</a:t>
@@ -4701,10 +5702,10 @@
       </p:sp>
       <p:sp>
         <p:nvSpPr>
-          <p:cNvPr id="22" name="Arrow: Right 21">
-            <a:extLst>
-              <a:ext uri="{FF2B5EF4-FFF2-40B4-BE49-F238E27FC236}">
-                <a16:creationId xmlns:a16="http://schemas.microsoft.com/office/drawing/2014/main" id="{9CF7D71E-5CA9-AB83-DBFA-4C54D95B8332}"/>
+          <p:cNvPr id="52" name="Rectangle: Rounded Corners 51">
+            <a:extLst>
+              <a:ext uri="{FF2B5EF4-FFF2-40B4-BE49-F238E27FC236}">
+                <a16:creationId xmlns:a16="http://schemas.microsoft.com/office/drawing/2014/main" id="{B961F6B5-E6B8-30DE-25A8-06AD0502FD52}"/>
               </a:ext>
             </a:extLst>
           </p:cNvPr>
@@ -4713,12 +5714,426 @@
         </p:nvSpPr>
         <p:spPr>
           <a:xfrm>
-            <a:off x="4243605" y="3560885"/>
-            <a:ext cx="773723" cy="606669"/>
+            <a:off x="2878945" y="2789866"/>
+            <a:ext cx="1148860" cy="1178171"/>
+          </a:xfrm>
+          <a:prstGeom prst="roundRect">
+            <a:avLst/>
+          </a:prstGeom>
+        </p:spPr>
+        <p:style>
+          <a:lnRef idx="2">
+            <a:schemeClr val="accent1">
+              <a:shade val="15000"/>
+            </a:schemeClr>
+          </a:lnRef>
+          <a:fillRef idx="1">
+            <a:schemeClr val="accent1"/>
+          </a:fillRef>
+          <a:effectRef idx="0">
+            <a:schemeClr val="accent1"/>
+          </a:effectRef>
+          <a:fontRef idx="minor">
+            <a:schemeClr val="lt1"/>
+          </a:fontRef>
+        </p:style>
+        <p:txBody>
+          <a:bodyPr rtlCol="0" anchor="ctr"/>
+          <a:lstStyle/>
+          <a:p>
+            <a:pPr algn="ctr"/>
+            <a:r>
+              <a:rPr lang="en-CA" sz="1500" b="1" dirty="0">
+                <a:latin typeface="Aptos" panose="020B0004020202020204" pitchFamily="34" charset="0"/>
+              </a:rPr>
+              <a:t>Find the most recent diary</a:t>
+            </a:r>
+          </a:p>
+        </p:txBody>
+      </p:sp>
+      <p:sp>
+        <p:nvSpPr>
+          <p:cNvPr id="53" name="Rectangle: Rounded Corners 52">
+            <a:extLst>
+              <a:ext uri="{FF2B5EF4-FFF2-40B4-BE49-F238E27FC236}">
+                <a16:creationId xmlns:a16="http://schemas.microsoft.com/office/drawing/2014/main" id="{4906D1DF-9A2A-9B2D-5AC7-2D9B830FF2CE}"/>
+              </a:ext>
+            </a:extLst>
+          </p:cNvPr>
+          <p:cNvSpPr/>
+          <p:nvPr/>
+        </p:nvSpPr>
+        <p:spPr>
+          <a:xfrm>
+            <a:off x="4690160" y="2789865"/>
+            <a:ext cx="1148860" cy="1178171"/>
+          </a:xfrm>
+          <a:prstGeom prst="roundRect">
+            <a:avLst/>
+          </a:prstGeom>
+        </p:spPr>
+        <p:style>
+          <a:lnRef idx="2">
+            <a:schemeClr val="accent5">
+              <a:shade val="15000"/>
+            </a:schemeClr>
+          </a:lnRef>
+          <a:fillRef idx="1">
+            <a:schemeClr val="accent5"/>
+          </a:fillRef>
+          <a:effectRef idx="0">
+            <a:schemeClr val="accent5"/>
+          </a:effectRef>
+          <a:fontRef idx="minor">
+            <a:schemeClr val="lt1"/>
+          </a:fontRef>
+        </p:style>
+        <p:txBody>
+          <a:bodyPr rtlCol="0" anchor="ctr"/>
+          <a:lstStyle/>
+          <a:p>
+            <a:pPr algn="ctr"/>
+            <a:r>
+              <a:rPr lang="en-CA" sz="1500" b="1" dirty="0">
+                <a:latin typeface="Aptos" panose="020B0004020202020204" pitchFamily="34" charset="0"/>
+              </a:rPr>
+              <a:t>Create monthly database</a:t>
+            </a:r>
+          </a:p>
+        </p:txBody>
+      </p:sp>
+      <p:sp>
+        <p:nvSpPr>
+          <p:cNvPr id="54" name="Rectangle: Rounded Corners 53">
+            <a:extLst>
+              <a:ext uri="{FF2B5EF4-FFF2-40B4-BE49-F238E27FC236}">
+                <a16:creationId xmlns:a16="http://schemas.microsoft.com/office/drawing/2014/main" id="{DEFABB15-B84D-FAF5-4029-58A94D6C0929}"/>
+              </a:ext>
+            </a:extLst>
+          </p:cNvPr>
+          <p:cNvSpPr/>
+          <p:nvPr/>
+        </p:nvSpPr>
+        <p:spPr>
+          <a:xfrm>
+            <a:off x="2878944" y="4615788"/>
+            <a:ext cx="1148860" cy="1178171"/>
+          </a:xfrm>
+          <a:prstGeom prst="roundRect">
+            <a:avLst/>
+          </a:prstGeom>
+        </p:spPr>
+        <p:style>
+          <a:lnRef idx="2">
+            <a:schemeClr val="accent5">
+              <a:shade val="15000"/>
+            </a:schemeClr>
+          </a:lnRef>
+          <a:fillRef idx="1">
+            <a:schemeClr val="accent5"/>
+          </a:fillRef>
+          <a:effectRef idx="0">
+            <a:schemeClr val="accent5"/>
+          </a:effectRef>
+          <a:fontRef idx="minor">
+            <a:schemeClr val="lt1"/>
+          </a:fontRef>
+        </p:style>
+        <p:txBody>
+          <a:bodyPr rtlCol="0" anchor="ctr"/>
+          <a:lstStyle/>
+          <a:p>
+            <a:pPr algn="ctr"/>
+            <a:r>
+              <a:rPr lang="en-CA" sz="1500" b="1" dirty="0">
+                <a:latin typeface="Aptos" panose="020B0004020202020204" pitchFamily="34" charset="0"/>
+              </a:rPr>
+              <a:t>Retrieve event info from diary</a:t>
+            </a:r>
+          </a:p>
+        </p:txBody>
+      </p:sp>
+      <p:sp>
+        <p:nvSpPr>
+          <p:cNvPr id="55" name="Rectangle: Rounded Corners 54">
+            <a:extLst>
+              <a:ext uri="{FF2B5EF4-FFF2-40B4-BE49-F238E27FC236}">
+                <a16:creationId xmlns:a16="http://schemas.microsoft.com/office/drawing/2014/main" id="{6EBC34B7-CCC2-2E96-ED69-7CC6F13565CE}"/>
+              </a:ext>
+            </a:extLst>
+          </p:cNvPr>
+          <p:cNvSpPr/>
+          <p:nvPr/>
+        </p:nvSpPr>
+        <p:spPr>
+          <a:xfrm>
+            <a:off x="4690160" y="4615788"/>
+            <a:ext cx="1148860" cy="1178171"/>
+          </a:xfrm>
+          <a:prstGeom prst="roundRect">
+            <a:avLst/>
+          </a:prstGeom>
+        </p:spPr>
+        <p:style>
+          <a:lnRef idx="2">
+            <a:schemeClr val="accent2">
+              <a:shade val="15000"/>
+            </a:schemeClr>
+          </a:lnRef>
+          <a:fillRef idx="1">
+            <a:schemeClr val="accent2"/>
+          </a:fillRef>
+          <a:effectRef idx="0">
+            <a:schemeClr val="accent2"/>
+          </a:effectRef>
+          <a:fontRef idx="minor">
+            <a:schemeClr val="lt1"/>
+          </a:fontRef>
+        </p:style>
+        <p:txBody>
+          <a:bodyPr rtlCol="0" anchor="ctr"/>
+          <a:lstStyle/>
+          <a:p>
+            <a:pPr algn="ctr"/>
+            <a:r>
+              <a:rPr lang="en-CA" sz="1500" b="1" dirty="0">
+                <a:latin typeface="Aptos" panose="020B0004020202020204" pitchFamily="34" charset="0"/>
+              </a:rPr>
+              <a:t>Create events in Google Calendar</a:t>
+            </a:r>
+          </a:p>
+        </p:txBody>
+      </p:sp>
+      <p:sp>
+        <p:nvSpPr>
+          <p:cNvPr id="56" name="Arrow: Down 55">
+            <a:extLst>
+              <a:ext uri="{FF2B5EF4-FFF2-40B4-BE49-F238E27FC236}">
+                <a16:creationId xmlns:a16="http://schemas.microsoft.com/office/drawing/2014/main" id="{8CC968C8-7B5A-61E4-957C-8010B368960B}"/>
+              </a:ext>
+            </a:extLst>
+          </p:cNvPr>
+          <p:cNvSpPr/>
+          <p:nvPr/>
+        </p:nvSpPr>
+        <p:spPr>
+          <a:xfrm>
+            <a:off x="3249686" y="4049183"/>
+            <a:ext cx="407377" cy="485459"/>
+          </a:xfrm>
+          <a:prstGeom prst="downArrow">
+            <a:avLst/>
+          </a:prstGeom>
+          <a:solidFill>
+            <a:schemeClr val="accent1"/>
+          </a:solidFill>
+          <a:ln>
+            <a:noFill/>
+          </a:ln>
+        </p:spPr>
+        <p:style>
+          <a:lnRef idx="2">
+            <a:schemeClr val="accent1">
+              <a:shade val="15000"/>
+            </a:schemeClr>
+          </a:lnRef>
+          <a:fillRef idx="1">
+            <a:schemeClr val="accent1"/>
+          </a:fillRef>
+          <a:effectRef idx="0">
+            <a:schemeClr val="accent1"/>
+          </a:effectRef>
+          <a:fontRef idx="minor">
+            <a:schemeClr val="lt1"/>
+          </a:fontRef>
+        </p:style>
+        <p:txBody>
+          <a:bodyPr rtlCol="0" anchor="ctr"/>
+          <a:lstStyle/>
+          <a:p>
+            <a:pPr algn="ctr"/>
+            <a:endParaRPr lang="en-CA"/>
+          </a:p>
+        </p:txBody>
+      </p:sp>
+      <p:sp>
+        <p:nvSpPr>
+          <p:cNvPr id="57" name="Arrow: Down 56">
+            <a:extLst>
+              <a:ext uri="{FF2B5EF4-FFF2-40B4-BE49-F238E27FC236}">
+                <a16:creationId xmlns:a16="http://schemas.microsoft.com/office/drawing/2014/main" id="{F02F329E-F68C-A85B-A38E-60249B7F5076}"/>
+              </a:ext>
+            </a:extLst>
+          </p:cNvPr>
+          <p:cNvSpPr/>
+          <p:nvPr/>
+        </p:nvSpPr>
+        <p:spPr>
+          <a:xfrm flipV="1">
+            <a:off x="5060901" y="4045715"/>
+            <a:ext cx="407377" cy="485459"/>
+          </a:xfrm>
+          <a:prstGeom prst="downArrow">
+            <a:avLst/>
+          </a:prstGeom>
+          <a:solidFill>
+            <a:schemeClr val="accent1"/>
+          </a:solidFill>
+          <a:ln>
+            <a:noFill/>
+          </a:ln>
+        </p:spPr>
+        <p:style>
+          <a:lnRef idx="2">
+            <a:schemeClr val="accent1">
+              <a:shade val="15000"/>
+            </a:schemeClr>
+          </a:lnRef>
+          <a:fillRef idx="1">
+            <a:schemeClr val="accent1"/>
+          </a:fillRef>
+          <a:effectRef idx="0">
+            <a:schemeClr val="accent1"/>
+          </a:effectRef>
+          <a:fontRef idx="minor">
+            <a:schemeClr val="lt1"/>
+          </a:fontRef>
+        </p:style>
+        <p:txBody>
+          <a:bodyPr rtlCol="0" anchor="ctr"/>
+          <a:lstStyle/>
+          <a:p>
+            <a:pPr algn="ctr"/>
+            <a:endParaRPr lang="en-CA"/>
+          </a:p>
+        </p:txBody>
+      </p:sp>
+      <p:sp>
+        <p:nvSpPr>
+          <p:cNvPr id="58" name="Arrow: Down 57">
+            <a:extLst>
+              <a:ext uri="{FF2B5EF4-FFF2-40B4-BE49-F238E27FC236}">
+                <a16:creationId xmlns:a16="http://schemas.microsoft.com/office/drawing/2014/main" id="{51E29D25-A30A-B3DF-6698-17ABE6234E14}"/>
+              </a:ext>
+            </a:extLst>
+          </p:cNvPr>
+          <p:cNvSpPr/>
+          <p:nvPr/>
+        </p:nvSpPr>
+        <p:spPr>
+          <a:xfrm flipV="1">
+            <a:off x="5060901" y="2218362"/>
+            <a:ext cx="407377" cy="485459"/>
+          </a:xfrm>
+          <a:prstGeom prst="downArrow">
+            <a:avLst/>
+          </a:prstGeom>
+          <a:solidFill>
+            <a:schemeClr val="accent1"/>
+          </a:solidFill>
+          <a:ln>
+            <a:noFill/>
+          </a:ln>
+        </p:spPr>
+        <p:style>
+          <a:lnRef idx="2">
+            <a:schemeClr val="accent1">
+              <a:shade val="15000"/>
+            </a:schemeClr>
+          </a:lnRef>
+          <a:fillRef idx="1">
+            <a:schemeClr val="accent1"/>
+          </a:fillRef>
+          <a:effectRef idx="0">
+            <a:schemeClr val="accent1"/>
+          </a:effectRef>
+          <a:fontRef idx="minor">
+            <a:schemeClr val="lt1"/>
+          </a:fontRef>
+        </p:style>
+        <p:txBody>
+          <a:bodyPr rtlCol="0" anchor="ctr"/>
+          <a:lstStyle/>
+          <a:p>
+            <a:pPr algn="ctr"/>
+            <a:endParaRPr lang="en-CA"/>
+          </a:p>
+        </p:txBody>
+      </p:sp>
+      <p:sp>
+        <p:nvSpPr>
+          <p:cNvPr id="60" name="Rectangle: Rounded Corners 59">
+            <a:extLst>
+              <a:ext uri="{FF2B5EF4-FFF2-40B4-BE49-F238E27FC236}">
+                <a16:creationId xmlns:a16="http://schemas.microsoft.com/office/drawing/2014/main" id="{02DE2F33-24DE-A326-648C-0AE3534C9B9E}"/>
+              </a:ext>
+            </a:extLst>
+          </p:cNvPr>
+          <p:cNvSpPr/>
+          <p:nvPr/>
+        </p:nvSpPr>
+        <p:spPr>
+          <a:xfrm>
+            <a:off x="6501375" y="959045"/>
+            <a:ext cx="1148860" cy="1178171"/>
+          </a:xfrm>
+          <a:prstGeom prst="roundRect">
+            <a:avLst/>
+          </a:prstGeom>
+        </p:spPr>
+        <p:style>
+          <a:lnRef idx="2">
+            <a:schemeClr val="accent2">
+              <a:shade val="15000"/>
+            </a:schemeClr>
+          </a:lnRef>
+          <a:fillRef idx="1">
+            <a:schemeClr val="accent2"/>
+          </a:fillRef>
+          <a:effectRef idx="0">
+            <a:schemeClr val="accent2"/>
+          </a:effectRef>
+          <a:fontRef idx="minor">
+            <a:schemeClr val="lt1"/>
+          </a:fontRef>
+        </p:style>
+        <p:txBody>
+          <a:bodyPr rtlCol="0" anchor="ctr"/>
+          <a:lstStyle/>
+          <a:p>
+            <a:pPr algn="ctr"/>
+            <a:r>
+              <a:rPr lang="en-CA" sz="1500" b="1" dirty="0">
+                <a:latin typeface="Aptos" panose="020B0004020202020204" pitchFamily="34" charset="0"/>
+              </a:rPr>
+              <a:t>Check events from Google Calendar</a:t>
+            </a:r>
+          </a:p>
+        </p:txBody>
+      </p:sp>
+      <p:sp>
+        <p:nvSpPr>
+          <p:cNvPr id="61" name="Arrow: Right 60">
+            <a:extLst>
+              <a:ext uri="{FF2B5EF4-FFF2-40B4-BE49-F238E27FC236}">
+                <a16:creationId xmlns:a16="http://schemas.microsoft.com/office/drawing/2014/main" id="{11AE411B-1759-2F99-7C6E-56F29683B098}"/>
+              </a:ext>
+            </a:extLst>
+          </p:cNvPr>
+          <p:cNvSpPr/>
+          <p:nvPr/>
+        </p:nvSpPr>
+        <p:spPr>
+          <a:xfrm>
+            <a:off x="5934269" y="1342063"/>
+            <a:ext cx="471855" cy="412134"/>
           </a:xfrm>
           <a:prstGeom prst="rightArrow">
             <a:avLst/>
           </a:prstGeom>
+          <a:solidFill>
+            <a:schemeClr val="accent1"/>
+          </a:solidFill>
           <a:ln>
             <a:noFill/>
           </a:ln>
@@ -4750,10 +6165,10 @@
       </p:sp>
       <p:sp>
         <p:nvSpPr>
-          <p:cNvPr id="23" name="Rectangle: Rounded Corners 22">
-            <a:extLst>
-              <a:ext uri="{FF2B5EF4-FFF2-40B4-BE49-F238E27FC236}">
-                <a16:creationId xmlns:a16="http://schemas.microsoft.com/office/drawing/2014/main" id="{BBDE3298-85FF-1012-89F9-739DCD275A0F}"/>
+          <p:cNvPr id="62" name="Arrow: Right 61">
+            <a:extLst>
+              <a:ext uri="{FF2B5EF4-FFF2-40B4-BE49-F238E27FC236}">
+                <a16:creationId xmlns:a16="http://schemas.microsoft.com/office/drawing/2014/main" id="{11D654CE-BFDD-97DC-028E-88B8A26ACC3C}"/>
               </a:ext>
             </a:extLst>
           </p:cNvPr>
@@ -4762,12 +6177,121 @@
         </p:nvSpPr>
         <p:spPr>
           <a:xfrm>
-            <a:off x="2406166" y="5540390"/>
-            <a:ext cx="1737946" cy="1065806"/>
+            <a:off x="7745486" y="1342063"/>
+            <a:ext cx="471855" cy="412134"/>
+          </a:xfrm>
+          <a:prstGeom prst="rightArrow">
+            <a:avLst/>
+          </a:prstGeom>
+          <a:solidFill>
+            <a:schemeClr val="accent1"/>
+          </a:solidFill>
+          <a:ln>
+            <a:noFill/>
+          </a:ln>
+        </p:spPr>
+        <p:style>
+          <a:lnRef idx="2">
+            <a:schemeClr val="accent6">
+              <a:shade val="15000"/>
+            </a:schemeClr>
+          </a:lnRef>
+          <a:fillRef idx="1">
+            <a:schemeClr val="accent6"/>
+          </a:fillRef>
+          <a:effectRef idx="0">
+            <a:schemeClr val="accent6"/>
+          </a:effectRef>
+          <a:fontRef idx="minor">
+            <a:schemeClr val="lt1"/>
+          </a:fontRef>
+        </p:style>
+        <p:txBody>
+          <a:bodyPr rtlCol="0" anchor="ctr"/>
+          <a:lstStyle/>
+          <a:p>
+            <a:pPr algn="ctr"/>
+            <a:endParaRPr lang="en-CA"/>
+          </a:p>
+        </p:txBody>
+      </p:sp>
+      <p:sp>
+        <p:nvSpPr>
+          <p:cNvPr id="63" name="Rectangle: Rounded Corners 62">
+            <a:extLst>
+              <a:ext uri="{FF2B5EF4-FFF2-40B4-BE49-F238E27FC236}">
+                <a16:creationId xmlns:a16="http://schemas.microsoft.com/office/drawing/2014/main" id="{EAD6824B-4B8E-D558-D2CF-4806BA09DA9D}"/>
+              </a:ext>
+            </a:extLst>
+          </p:cNvPr>
+          <p:cNvSpPr/>
+          <p:nvPr/>
+        </p:nvSpPr>
+        <p:spPr>
+          <a:xfrm>
+            <a:off x="8312590" y="959045"/>
+            <a:ext cx="1148860" cy="1178171"/>
           </a:xfrm>
           <a:prstGeom prst="roundRect">
             <a:avLst/>
           </a:prstGeom>
+        </p:spPr>
+        <p:style>
+          <a:lnRef idx="2">
+            <a:schemeClr val="accent5">
+              <a:shade val="15000"/>
+            </a:schemeClr>
+          </a:lnRef>
+          <a:fillRef idx="1">
+            <a:schemeClr val="accent5"/>
+          </a:fillRef>
+          <a:effectRef idx="0">
+            <a:schemeClr val="accent5"/>
+          </a:effectRef>
+          <a:fontRef idx="minor">
+            <a:schemeClr val="lt1"/>
+          </a:fontRef>
+        </p:style>
+        <p:txBody>
+          <a:bodyPr rtlCol="0" anchor="ctr"/>
+          <a:lstStyle/>
+          <a:p>
+            <a:pPr algn="ctr"/>
+            <a:r>
+              <a:rPr lang="en-CA" sz="1500" b="1" dirty="0">
+                <a:latin typeface="Aptos" panose="020B0004020202020204" pitchFamily="34" charset="0"/>
+              </a:rPr>
+              <a:t>Check if today’s daily diary exists</a:t>
+            </a:r>
+          </a:p>
+        </p:txBody>
+      </p:sp>
+      <p:sp>
+        <p:nvSpPr>
+          <p:cNvPr id="64" name="Arrow: Down 63">
+            <a:extLst>
+              <a:ext uri="{FF2B5EF4-FFF2-40B4-BE49-F238E27FC236}">
+                <a16:creationId xmlns:a16="http://schemas.microsoft.com/office/drawing/2014/main" id="{B6D0D7DC-407A-8856-B504-67ABC2769E11}"/>
+              </a:ext>
+            </a:extLst>
+          </p:cNvPr>
+          <p:cNvSpPr/>
+          <p:nvPr/>
+        </p:nvSpPr>
+        <p:spPr>
+          <a:xfrm>
+            <a:off x="8691495" y="2266361"/>
+            <a:ext cx="407377" cy="485459"/>
+          </a:xfrm>
+          <a:prstGeom prst="downArrow">
+            <a:avLst/>
+          </a:prstGeom>
+          <a:solidFill>
+            <a:srgbClr val="C00000"/>
+          </a:solidFill>
+          <a:ln>
+            <a:noFill/>
+          </a:ln>
         </p:spPr>
         <p:style>
           <a:lnRef idx="2">
@@ -4790,21 +6314,54 @@
           <a:lstStyle/>
           <a:p>
             <a:pPr algn="ctr"/>
-            <a:r>
-              <a:rPr lang="en-CA" b="1" dirty="0">
+            <a:endParaRPr lang="en-CA"/>
+          </a:p>
+        </p:txBody>
+      </p:sp>
+      <p:sp>
+        <p:nvSpPr>
+          <p:cNvPr id="65" name="TextBox 64">
+            <a:extLst>
+              <a:ext uri="{FF2B5EF4-FFF2-40B4-BE49-F238E27FC236}">
+                <a16:creationId xmlns:a16="http://schemas.microsoft.com/office/drawing/2014/main" id="{76867A14-C97C-DFA3-36FA-BA1B20483ADC}"/>
+              </a:ext>
+            </a:extLst>
+          </p:cNvPr>
+          <p:cNvSpPr txBox="1"/>
+          <p:nvPr/>
+        </p:nvSpPr>
+        <p:spPr>
+          <a:xfrm>
+            <a:off x="8273021" y="2347507"/>
+            <a:ext cx="474472" cy="323165"/>
+          </a:xfrm>
+          <a:prstGeom prst="rect">
+            <a:avLst/>
+          </a:prstGeom>
+          <a:noFill/>
+        </p:spPr>
+        <p:txBody>
+          <a:bodyPr wrap="square" rtlCol="0">
+            <a:spAutoFit/>
+          </a:bodyPr>
+          <a:lstStyle/>
+          <a:p>
+            <a:pPr algn="ctr"/>
+            <a:r>
+              <a:rPr lang="en-CA" sz="1500" dirty="0">
                 <a:latin typeface="Aptos" panose="020B0004020202020204" pitchFamily="34" charset="0"/>
               </a:rPr>
-              <a:t>Create monthly database</a:t>
-            </a:r>
-          </a:p>
-        </p:txBody>
-      </p:sp>
-      <p:sp>
-        <p:nvSpPr>
-          <p:cNvPr id="24" name="Rectangle: Rounded Corners 23">
-            <a:extLst>
-              <a:ext uri="{FF2B5EF4-FFF2-40B4-BE49-F238E27FC236}">
-                <a16:creationId xmlns:a16="http://schemas.microsoft.com/office/drawing/2014/main" id="{6EBC2D21-2162-24B0-82C5-908D15FF68DB}"/>
+              <a:t>NO</a:t>
+            </a:r>
+          </a:p>
+        </p:txBody>
+      </p:sp>
+      <p:sp>
+        <p:nvSpPr>
+          <p:cNvPr id="66" name="Rectangle: Rounded Corners 65">
+            <a:extLst>
+              <a:ext uri="{FF2B5EF4-FFF2-40B4-BE49-F238E27FC236}">
+                <a16:creationId xmlns:a16="http://schemas.microsoft.com/office/drawing/2014/main" id="{15981D6E-19C1-F1E8-7A27-C5F603229681}"/>
               </a:ext>
             </a:extLst>
           </p:cNvPr>
@@ -4813,8 +6370,8 @@
         </p:nvSpPr>
         <p:spPr>
           <a:xfrm>
-            <a:off x="5069974" y="3094890"/>
-            <a:ext cx="1737946" cy="1485900"/>
+            <a:off x="8320754" y="2832966"/>
+            <a:ext cx="1148860" cy="1178171"/>
           </a:xfrm>
           <a:prstGeom prst="roundRect">
             <a:avLst/>
@@ -4842,20 +6399,20 @@
           <a:p>
             <a:pPr algn="ctr"/>
             <a:r>
-              <a:rPr lang="en-CA" b="1" dirty="0">
+              <a:rPr lang="en-CA" sz="1500" b="1" dirty="0">
                 <a:latin typeface="Aptos" panose="020B0004020202020204" pitchFamily="34" charset="0"/>
               </a:rPr>
-              <a:t>Copy diary template</a:t>
-            </a:r>
-          </a:p>
-        </p:txBody>
-      </p:sp>
-      <p:sp>
-        <p:nvSpPr>
-          <p:cNvPr id="25" name="Arrow: Bent-Up 24">
-            <a:extLst>
-              <a:ext uri="{FF2B5EF4-FFF2-40B4-BE49-F238E27FC236}">
-                <a16:creationId xmlns:a16="http://schemas.microsoft.com/office/drawing/2014/main" id="{8C8FEB69-CA9B-F15A-6F9F-546DB8176565}"/>
+              <a:t>Find the most recent diary</a:t>
+            </a:r>
+          </a:p>
+        </p:txBody>
+      </p:sp>
+      <p:sp>
+        <p:nvSpPr>
+          <p:cNvPr id="67" name="Rectangle: Rounded Corners 66">
+            <a:extLst>
+              <a:ext uri="{FF2B5EF4-FFF2-40B4-BE49-F238E27FC236}">
+                <a16:creationId xmlns:a16="http://schemas.microsoft.com/office/drawing/2014/main" id="{CA87080E-BF83-8F87-D85A-E9287D22B1FF}"/>
               </a:ext>
             </a:extLst>
           </p:cNvPr>
@@ -4864,16 +6421,66 @@
         </p:nvSpPr>
         <p:spPr>
           <a:xfrm>
-            <a:off x="4337593" y="4763184"/>
-            <a:ext cx="1931322" cy="1485900"/>
-          </a:xfrm>
-          <a:prstGeom prst="bentUpArrow">
-            <a:avLst>
-              <a:gd name="adj1" fmla="val 25000"/>
-              <a:gd name="adj2" fmla="val 25000"/>
-              <a:gd name="adj3" fmla="val 26183"/>
-            </a:avLst>
+            <a:off x="10131971" y="2832965"/>
+            <a:ext cx="1148860" cy="1178171"/>
+          </a:xfrm>
+          <a:prstGeom prst="roundRect">
+            <a:avLst/>
           </a:prstGeom>
+        </p:spPr>
+        <p:style>
+          <a:lnRef idx="2">
+            <a:schemeClr val="accent5">
+              <a:shade val="15000"/>
+            </a:schemeClr>
+          </a:lnRef>
+          <a:fillRef idx="1">
+            <a:schemeClr val="accent5"/>
+          </a:fillRef>
+          <a:effectRef idx="0">
+            <a:schemeClr val="accent5"/>
+          </a:effectRef>
+          <a:fontRef idx="minor">
+            <a:schemeClr val="lt1"/>
+          </a:fontRef>
+        </p:style>
+        <p:txBody>
+          <a:bodyPr rtlCol="0" anchor="ctr"/>
+          <a:lstStyle/>
+          <a:p>
+            <a:pPr algn="ctr"/>
+            <a:r>
+              <a:rPr lang="en-CA" sz="1500" b="1" dirty="0">
+                <a:latin typeface="Aptos" panose="020B0004020202020204" pitchFamily="34" charset="0"/>
+              </a:rPr>
+              <a:t>Create daily diary for today</a:t>
+            </a:r>
+          </a:p>
+        </p:txBody>
+      </p:sp>
+      <p:sp>
+        <p:nvSpPr>
+          <p:cNvPr id="70" name="Arrow: Down 69">
+            <a:extLst>
+              <a:ext uri="{FF2B5EF4-FFF2-40B4-BE49-F238E27FC236}">
+                <a16:creationId xmlns:a16="http://schemas.microsoft.com/office/drawing/2014/main" id="{35088D90-C03C-8A7E-DC49-8065041976EA}"/>
+              </a:ext>
+            </a:extLst>
+          </p:cNvPr>
+          <p:cNvSpPr/>
+          <p:nvPr/>
+        </p:nvSpPr>
+        <p:spPr>
+          <a:xfrm>
+            <a:off x="8691495" y="4092283"/>
+            <a:ext cx="407377" cy="485459"/>
+          </a:xfrm>
+          <a:prstGeom prst="downArrow">
+            <a:avLst/>
+          </a:prstGeom>
+          <a:solidFill>
+            <a:schemeClr val="accent1"/>
+          </a:solidFill>
           <a:ln>
             <a:noFill/>
           </a:ln>
@@ -4905,10 +6512,10 @@
       </p:sp>
       <p:sp>
         <p:nvSpPr>
-          <p:cNvPr id="3" name="Rectangle: Rounded Corners 2">
-            <a:extLst>
-              <a:ext uri="{FF2B5EF4-FFF2-40B4-BE49-F238E27FC236}">
-                <a16:creationId xmlns:a16="http://schemas.microsoft.com/office/drawing/2014/main" id="{23EFE4FF-38D6-2A9B-0C47-0B2FD8F4705A}"/>
+          <p:cNvPr id="71" name="Arrow: Down 70">
+            <a:extLst>
+              <a:ext uri="{FF2B5EF4-FFF2-40B4-BE49-F238E27FC236}">
+                <a16:creationId xmlns:a16="http://schemas.microsoft.com/office/drawing/2014/main" id="{6ED2EA78-7C0C-48B9-9832-38FBF8EA7CC8}"/>
               </a:ext>
             </a:extLst>
           </p:cNvPr>
@@ -4916,13 +6523,19 @@
           <p:nvPr/>
         </p:nvSpPr>
         <p:spPr>
-          <a:xfrm>
-            <a:off x="7678143" y="3094890"/>
-            <a:ext cx="1737946" cy="1485900"/>
-          </a:xfrm>
-          <a:prstGeom prst="roundRect">
+          <a:xfrm flipV="1">
+            <a:off x="10502712" y="4092283"/>
+            <a:ext cx="407377" cy="485459"/>
+          </a:xfrm>
+          <a:prstGeom prst="downArrow">
             <a:avLst/>
           </a:prstGeom>
+          <a:solidFill>
+            <a:schemeClr val="accent1"/>
+          </a:solidFill>
+          <a:ln>
+            <a:noFill/>
+          </a:ln>
         </p:spPr>
         <p:style>
           <a:lnRef idx="2">
@@ -4945,21 +6558,16 @@
           <a:lstStyle/>
           <a:p>
             <a:pPr algn="ctr"/>
-            <a:r>
-              <a:rPr lang="en-CA" b="1" dirty="0">
-                <a:latin typeface="Aptos" panose="020B0004020202020204" pitchFamily="34" charset="0"/>
-              </a:rPr>
-              <a:t>Check events from Google Calendar</a:t>
-            </a:r>
-          </a:p>
-        </p:txBody>
-      </p:sp>
-      <p:sp>
-        <p:nvSpPr>
-          <p:cNvPr id="4" name="Arrow: Right 3">
-            <a:extLst>
-              <a:ext uri="{FF2B5EF4-FFF2-40B4-BE49-F238E27FC236}">
-                <a16:creationId xmlns:a16="http://schemas.microsoft.com/office/drawing/2014/main" id="{A5BF445E-789E-ED77-A7C5-AC1A8CD3D8B5}"/>
+            <a:endParaRPr lang="en-CA"/>
+          </a:p>
+        </p:txBody>
+      </p:sp>
+      <p:sp>
+        <p:nvSpPr>
+          <p:cNvPr id="74" name="Arrow: Right 73">
+            <a:extLst>
+              <a:ext uri="{FF2B5EF4-FFF2-40B4-BE49-F238E27FC236}">
+                <a16:creationId xmlns:a16="http://schemas.microsoft.com/office/drawing/2014/main" id="{4267ACCD-2690-69CD-32B3-72C911CC477F}"/>
               </a:ext>
             </a:extLst>
           </p:cNvPr>
@@ -4968,12 +6576,102 @@
         </p:nvSpPr>
         <p:spPr>
           <a:xfrm>
-            <a:off x="6878150" y="3560885"/>
-            <a:ext cx="773723" cy="606669"/>
+            <a:off x="9569366" y="1342064"/>
+            <a:ext cx="471855" cy="412134"/>
           </a:xfrm>
           <a:prstGeom prst="rightArrow">
             <a:avLst/>
           </a:prstGeom>
+          <a:ln>
+            <a:noFill/>
+          </a:ln>
+        </p:spPr>
+        <p:style>
+          <a:lnRef idx="2">
+            <a:schemeClr val="accent6">
+              <a:shade val="15000"/>
+            </a:schemeClr>
+          </a:lnRef>
+          <a:fillRef idx="1">
+            <a:schemeClr val="accent6"/>
+          </a:fillRef>
+          <a:effectRef idx="0">
+            <a:schemeClr val="accent6"/>
+          </a:effectRef>
+          <a:fontRef idx="minor">
+            <a:schemeClr val="lt1"/>
+          </a:fontRef>
+        </p:style>
+        <p:txBody>
+          <a:bodyPr rtlCol="0" anchor="ctr"/>
+          <a:lstStyle/>
+          <a:p>
+            <a:pPr algn="ctr"/>
+            <a:endParaRPr lang="en-CA"/>
+          </a:p>
+        </p:txBody>
+      </p:sp>
+      <p:sp>
+        <p:nvSpPr>
+          <p:cNvPr id="75" name="TextBox 74">
+            <a:extLst>
+              <a:ext uri="{FF2B5EF4-FFF2-40B4-BE49-F238E27FC236}">
+                <a16:creationId xmlns:a16="http://schemas.microsoft.com/office/drawing/2014/main" id="{905B198D-CE17-E113-33A0-C2028F00FDCD}"/>
+              </a:ext>
+            </a:extLst>
+          </p:cNvPr>
+          <p:cNvSpPr txBox="1"/>
+          <p:nvPr/>
+        </p:nvSpPr>
+        <p:spPr>
+          <a:xfrm>
+            <a:off x="9507712" y="959045"/>
+            <a:ext cx="533509" cy="323165"/>
+          </a:xfrm>
+          <a:prstGeom prst="rect">
+            <a:avLst/>
+          </a:prstGeom>
+          <a:noFill/>
+        </p:spPr>
+        <p:txBody>
+          <a:bodyPr wrap="square" rtlCol="0">
+            <a:spAutoFit/>
+          </a:bodyPr>
+          <a:lstStyle/>
+          <a:p>
+            <a:pPr algn="ctr"/>
+            <a:r>
+              <a:rPr lang="en-CA" sz="1500" dirty="0">
+                <a:latin typeface="Aptos" panose="020B0004020202020204" pitchFamily="34" charset="0"/>
+              </a:rPr>
+              <a:t>YES</a:t>
+            </a:r>
+          </a:p>
+        </p:txBody>
+      </p:sp>
+      <p:sp>
+        <p:nvSpPr>
+          <p:cNvPr id="76" name="Arrow: Down 75">
+            <a:extLst>
+              <a:ext uri="{FF2B5EF4-FFF2-40B4-BE49-F238E27FC236}">
+                <a16:creationId xmlns:a16="http://schemas.microsoft.com/office/drawing/2014/main" id="{CF16C855-0FCD-95A4-EE3F-B035D0A9CB9C}"/>
+              </a:ext>
+            </a:extLst>
+          </p:cNvPr>
+          <p:cNvSpPr/>
+          <p:nvPr/>
+        </p:nvSpPr>
+        <p:spPr>
+          <a:xfrm flipV="1">
+            <a:off x="10507212" y="2218362"/>
+            <a:ext cx="407377" cy="485459"/>
+          </a:xfrm>
+          <a:prstGeom prst="downArrow">
+            <a:avLst/>
+          </a:prstGeom>
+          <a:solidFill>
+            <a:schemeClr val="accent1"/>
+          </a:solidFill>
           <a:ln>
             <a:noFill/>
           </a:ln>
@@ -5003,12 +6701,51 @@
           </a:p>
         </p:txBody>
       </p:sp>
-      <p:sp>
-        <p:nvSpPr>
-          <p:cNvPr id="5" name="Rectangle: Rounded Corners 4">
-            <a:extLst>
-              <a:ext uri="{FF2B5EF4-FFF2-40B4-BE49-F238E27FC236}">
-                <a16:creationId xmlns:a16="http://schemas.microsoft.com/office/drawing/2014/main" id="{2C88AEDB-2A12-22F9-29B2-9552CEA06DD9}"/>
+      <p:pic>
+        <p:nvPicPr>
+          <p:cNvPr id="79" name="Graphic 78" descr="Flag with solid fill">
+            <a:extLst>
+              <a:ext uri="{FF2B5EF4-FFF2-40B4-BE49-F238E27FC236}">
+                <a16:creationId xmlns:a16="http://schemas.microsoft.com/office/drawing/2014/main" id="{B69CFD8F-6213-F3EA-6792-81963DF83291}"/>
+              </a:ext>
+            </a:extLst>
+          </p:cNvPr>
+          <p:cNvPicPr>
+            <a:picLocks noChangeAspect="1"/>
+          </p:cNvPicPr>
+          <p:nvPr/>
+        </p:nvPicPr>
+        <p:blipFill>
+          <a:blip r:embed="rId2">
+            <a:extLst>
+              <a:ext uri="{28A0092B-C50C-407E-A947-70E740481C1C}">
+                <a14:useLocalDpi xmlns:a14="http://schemas.microsoft.com/office/drawing/2010/main" val="0"/>
+              </a:ext>
+              <a:ext uri="{96DAC541-7B7A-43D3-8B79-37D633B846F1}">
+                <asvg:svgBlip xmlns:asvg="http://schemas.microsoft.com/office/drawing/2016/SVG/main" r:embed="rId3"/>
+              </a:ext>
+            </a:extLst>
+          </a:blip>
+          <a:stretch>
+            <a:fillRect/>
+          </a:stretch>
+        </p:blipFill>
+        <p:spPr>
+          <a:xfrm>
+            <a:off x="10179909" y="996517"/>
+            <a:ext cx="1140698" cy="1140698"/>
+          </a:xfrm>
+          <a:prstGeom prst="rect">
+            <a:avLst/>
+          </a:prstGeom>
+        </p:spPr>
+      </p:pic>
+      <p:sp>
+        <p:nvSpPr>
+          <p:cNvPr id="59" name="Arrow: Right 58">
+            <a:extLst>
+              <a:ext uri="{FF2B5EF4-FFF2-40B4-BE49-F238E27FC236}">
+                <a16:creationId xmlns:a16="http://schemas.microsoft.com/office/drawing/2014/main" id="{741082AB-D393-9B4E-EF1B-7EDD585C14BB}"/>
               </a:ext>
             </a:extLst>
           </p:cNvPr>
@@ -5017,24 +6754,32 @@
         </p:nvSpPr>
         <p:spPr>
           <a:xfrm>
-            <a:off x="10262081" y="3094890"/>
-            <a:ext cx="1737946" cy="1485900"/>
-          </a:xfrm>
-          <a:prstGeom prst="roundRect">
+            <a:off x="4123054" y="4998806"/>
+            <a:ext cx="471855" cy="412134"/>
+          </a:xfrm>
+          <a:prstGeom prst="rightArrow">
             <a:avLst/>
           </a:prstGeom>
+          <a:solidFill>
+            <a:schemeClr val="accent1"/>
+          </a:solidFill>
+          <a:ln>
+            <a:solidFill>
+              <a:srgbClr val="002060"/>
+            </a:solidFill>
+          </a:ln>
         </p:spPr>
         <p:style>
           <a:lnRef idx="2">
-            <a:schemeClr val="accent1">
+            <a:schemeClr val="accent6">
               <a:shade val="15000"/>
             </a:schemeClr>
           </a:lnRef>
           <a:fillRef idx="1">
-            <a:schemeClr val="accent1"/>
+            <a:schemeClr val="accent6"/>
           </a:fillRef>
           <a:effectRef idx="0">
-            <a:schemeClr val="accent1"/>
+            <a:schemeClr val="accent6"/>
           </a:effectRef>
           <a:fontRef idx="minor">
             <a:schemeClr val="lt1"/>
@@ -5045,21 +6790,16 @@
           <a:lstStyle/>
           <a:p>
             <a:pPr algn="ctr"/>
-            <a:r>
-              <a:rPr lang="en-CA" b="1" dirty="0">
-                <a:latin typeface="Aptos" panose="020B0004020202020204" pitchFamily="34" charset="0"/>
-              </a:rPr>
-              <a:t>Check if daily diary document exists</a:t>
-            </a:r>
-          </a:p>
-        </p:txBody>
-      </p:sp>
-      <p:sp>
-        <p:nvSpPr>
-          <p:cNvPr id="6" name="Arrow: Right 5">
-            <a:extLst>
-              <a:ext uri="{FF2B5EF4-FFF2-40B4-BE49-F238E27FC236}">
-                <a16:creationId xmlns:a16="http://schemas.microsoft.com/office/drawing/2014/main" id="{7EF55DB1-DA12-4747-5D4D-029F50CBE0D4}"/>
+            <a:endParaRPr lang="en-CA"/>
+          </a:p>
+        </p:txBody>
+      </p:sp>
+      <p:sp>
+        <p:nvSpPr>
+          <p:cNvPr id="85" name="Rectangle: Rounded Corners 84">
+            <a:extLst>
+              <a:ext uri="{FF2B5EF4-FFF2-40B4-BE49-F238E27FC236}">
+                <a16:creationId xmlns:a16="http://schemas.microsoft.com/office/drawing/2014/main" id="{E1C505CC-13B1-997C-962E-A31D5AE7DA7B}"/>
               </a:ext>
             </a:extLst>
           </p:cNvPr>
@@ -5068,27 +6808,24 @@
         </p:nvSpPr>
         <p:spPr>
           <a:xfrm>
-            <a:off x="9468629" y="3560885"/>
-            <a:ext cx="773723" cy="606669"/>
-          </a:xfrm>
-          <a:prstGeom prst="rightArrow">
+            <a:off x="8234029" y="4658888"/>
+            <a:ext cx="3103058" cy="1259317"/>
+          </a:xfrm>
+          <a:prstGeom prst="roundRect">
             <a:avLst/>
           </a:prstGeom>
-          <a:ln>
-            <a:noFill/>
-          </a:ln>
         </p:spPr>
         <p:style>
           <a:lnRef idx="2">
-            <a:schemeClr val="accent1">
+            <a:schemeClr val="accent4">
               <a:shade val="15000"/>
             </a:schemeClr>
           </a:lnRef>
           <a:fillRef idx="1">
-            <a:schemeClr val="accent1"/>
+            <a:schemeClr val="accent4"/>
           </a:fillRef>
           <a:effectRef idx="0">
-            <a:schemeClr val="accent1"/>
+            <a:schemeClr val="accent4"/>
           </a:effectRef>
           <a:fontRef idx="minor">
             <a:schemeClr val="lt1"/>
@@ -5105,10 +6842,10 @@
       </p:sp>
       <p:sp>
         <p:nvSpPr>
-          <p:cNvPr id="7" name="Arrow: Down 6">
-            <a:extLst>
-              <a:ext uri="{FF2B5EF4-FFF2-40B4-BE49-F238E27FC236}">
-                <a16:creationId xmlns:a16="http://schemas.microsoft.com/office/drawing/2014/main" id="{8C537069-3E37-8AD6-EC37-B591E7076D14}"/>
+          <p:cNvPr id="86" name="Rectangle: Rounded Corners 85">
+            <a:extLst>
+              <a:ext uri="{FF2B5EF4-FFF2-40B4-BE49-F238E27FC236}">
+                <a16:creationId xmlns:a16="http://schemas.microsoft.com/office/drawing/2014/main" id="{01D398B3-E188-D434-58B5-C5CBC2368315}"/>
               </a:ext>
             </a:extLst>
           </p:cNvPr>
@@ -5117,30 +6854,24 @@
         </p:nvSpPr>
         <p:spPr>
           <a:xfrm>
-            <a:off x="10782300" y="4719586"/>
-            <a:ext cx="571500" cy="703385"/>
-          </a:xfrm>
-          <a:prstGeom prst="downArrow">
+            <a:off x="8305521" y="4696934"/>
+            <a:ext cx="1148860" cy="1178171"/>
+          </a:xfrm>
+          <a:prstGeom prst="roundRect">
             <a:avLst/>
           </a:prstGeom>
-          <a:solidFill>
-            <a:srgbClr val="C00000"/>
-          </a:solidFill>
-          <a:ln>
-            <a:noFill/>
-          </a:ln>
         </p:spPr>
         <p:style>
           <a:lnRef idx="2">
-            <a:schemeClr val="accent1">
+            <a:schemeClr val="accent5">
               <a:shade val="15000"/>
             </a:schemeClr>
           </a:lnRef>
           <a:fillRef idx="1">
-            <a:schemeClr val="accent1"/>
+            <a:schemeClr val="accent5"/>
           </a:fillRef>
           <a:effectRef idx="0">
-            <a:schemeClr val="accent1"/>
+            <a:schemeClr val="accent5"/>
           </a:effectRef>
           <a:fontRef idx="minor">
             <a:schemeClr val="lt1"/>
@@ -5151,54 +6882,21 @@
           <a:lstStyle/>
           <a:p>
             <a:pPr algn="ctr"/>
-            <a:endParaRPr lang="en-CA"/>
-          </a:p>
-        </p:txBody>
-      </p:sp>
-      <p:sp>
-        <p:nvSpPr>
-          <p:cNvPr id="8" name="TextBox 7">
-            <a:extLst>
-              <a:ext uri="{FF2B5EF4-FFF2-40B4-BE49-F238E27FC236}">
-                <a16:creationId xmlns:a16="http://schemas.microsoft.com/office/drawing/2014/main" id="{73CB6C80-5F23-27B5-621B-0B256F853A80}"/>
-              </a:ext>
-            </a:extLst>
-          </p:cNvPr>
-          <p:cNvSpPr txBox="1"/>
-          <p:nvPr/>
-        </p:nvSpPr>
-        <p:spPr>
-          <a:xfrm>
-            <a:off x="10105601" y="4886612"/>
-            <a:ext cx="571500" cy="369332"/>
-          </a:xfrm>
-          <a:prstGeom prst="rect">
-            <a:avLst/>
-          </a:prstGeom>
-          <a:noFill/>
-        </p:spPr>
-        <p:txBody>
-          <a:bodyPr wrap="square" rtlCol="0">
-            <a:spAutoFit/>
-          </a:bodyPr>
-          <a:lstStyle/>
-          <a:p>
-            <a:pPr algn="ctr"/>
-            <a:r>
-              <a:rPr lang="en-CA" dirty="0">
+            <a:r>
+              <a:rPr lang="en-CA" sz="1500" b="1" dirty="0">
                 <a:latin typeface="Aptos" panose="020B0004020202020204" pitchFamily="34" charset="0"/>
               </a:rPr>
-              <a:t>NO</a:t>
-            </a:r>
-          </a:p>
-        </p:txBody>
-      </p:sp>
-      <p:sp>
-        <p:nvSpPr>
-          <p:cNvPr id="9" name="Rectangle: Rounded Corners 8">
-            <a:extLst>
-              <a:ext uri="{FF2B5EF4-FFF2-40B4-BE49-F238E27FC236}">
-                <a16:creationId xmlns:a16="http://schemas.microsoft.com/office/drawing/2014/main" id="{4A1C84FF-563B-41CC-B321-0900CE3A4440}"/>
+              <a:t>Retrieve event info from diary</a:t>
+            </a:r>
+          </a:p>
+        </p:txBody>
+      </p:sp>
+      <p:sp>
+        <p:nvSpPr>
+          <p:cNvPr id="87" name="Rectangle: Rounded Corners 86">
+            <a:extLst>
+              <a:ext uri="{FF2B5EF4-FFF2-40B4-BE49-F238E27FC236}">
+                <a16:creationId xmlns:a16="http://schemas.microsoft.com/office/drawing/2014/main" id="{D1BEF357-BECD-9710-A9F4-6EFCE0BA9F6E}"/>
               </a:ext>
             </a:extLst>
           </p:cNvPr>
@@ -5207,8 +6905,8 @@
         </p:nvSpPr>
         <p:spPr>
           <a:xfrm>
-            <a:off x="10199077" y="5540390"/>
-            <a:ext cx="1737946" cy="1065806"/>
+            <a:off x="10116737" y="4696934"/>
+            <a:ext cx="1148860" cy="1178171"/>
           </a:xfrm>
           <a:prstGeom prst="roundRect">
             <a:avLst/>
@@ -5216,15 +6914,15 @@
         </p:spPr>
         <p:style>
           <a:lnRef idx="2">
-            <a:schemeClr val="accent1">
+            <a:schemeClr val="accent2">
               <a:shade val="15000"/>
             </a:schemeClr>
           </a:lnRef>
           <a:fillRef idx="1">
-            <a:schemeClr val="accent1"/>
+            <a:schemeClr val="accent2"/>
           </a:fillRef>
           <a:effectRef idx="0">
-            <a:schemeClr val="accent1"/>
+            <a:schemeClr val="accent2"/>
           </a:effectRef>
           <a:fontRef idx="minor">
             <a:schemeClr val="lt1"/>
@@ -5236,10 +6934,648 @@
           <a:p>
             <a:pPr algn="ctr"/>
             <a:r>
+              <a:rPr lang="en-CA" sz="1500" b="1" dirty="0">
+                <a:latin typeface="Aptos" panose="020B0004020202020204" pitchFamily="34" charset="0"/>
+              </a:rPr>
+              <a:t>Create events in Google Calendar</a:t>
+            </a:r>
+          </a:p>
+        </p:txBody>
+      </p:sp>
+      <p:sp>
+        <p:nvSpPr>
+          <p:cNvPr id="88" name="Arrow: Right 87">
+            <a:extLst>
+              <a:ext uri="{FF2B5EF4-FFF2-40B4-BE49-F238E27FC236}">
+                <a16:creationId xmlns:a16="http://schemas.microsoft.com/office/drawing/2014/main" id="{DD52A278-107E-FD09-301D-019F79029098}"/>
+              </a:ext>
+            </a:extLst>
+          </p:cNvPr>
+          <p:cNvSpPr/>
+          <p:nvPr/>
+        </p:nvSpPr>
+        <p:spPr>
+          <a:xfrm>
+            <a:off x="9549631" y="5079952"/>
+            <a:ext cx="471855" cy="412134"/>
+          </a:xfrm>
+          <a:prstGeom prst="rightArrow">
+            <a:avLst/>
+          </a:prstGeom>
+          <a:solidFill>
+            <a:schemeClr val="accent1"/>
+          </a:solidFill>
+          <a:ln>
+            <a:solidFill>
+              <a:srgbClr val="002060"/>
+            </a:solidFill>
+          </a:ln>
+        </p:spPr>
+        <p:style>
+          <a:lnRef idx="2">
+            <a:schemeClr val="accent6">
+              <a:shade val="15000"/>
+            </a:schemeClr>
+          </a:lnRef>
+          <a:fillRef idx="1">
+            <a:schemeClr val="accent6"/>
+          </a:fillRef>
+          <a:effectRef idx="0">
+            <a:schemeClr val="accent6"/>
+          </a:effectRef>
+          <a:fontRef idx="minor">
+            <a:schemeClr val="lt1"/>
+          </a:fontRef>
+        </p:style>
+        <p:txBody>
+          <a:bodyPr rtlCol="0" anchor="ctr"/>
+          <a:lstStyle/>
+          <a:p>
+            <a:pPr algn="ctr"/>
+            <a:endParaRPr lang="en-CA"/>
+          </a:p>
+        </p:txBody>
+      </p:sp>
+      <p:sp>
+        <p:nvSpPr>
+          <p:cNvPr id="90" name="Title 1">
+            <a:extLst>
+              <a:ext uri="{FF2B5EF4-FFF2-40B4-BE49-F238E27FC236}">
+                <a16:creationId xmlns:a16="http://schemas.microsoft.com/office/drawing/2014/main" id="{950673D0-4F11-CC16-8BF5-85F388951F89}"/>
+              </a:ext>
+            </a:extLst>
+          </p:cNvPr>
+          <p:cNvSpPr>
+            <a:spLocks noGrp="1"/>
+          </p:cNvSpPr>
+          <p:nvPr>
+            <p:ph type="title"/>
+          </p:nvPr>
+        </p:nvSpPr>
+        <p:spPr>
+          <a:xfrm>
+            <a:off x="323987" y="4748158"/>
+            <a:ext cx="2280998" cy="1325563"/>
+          </a:xfrm>
+        </p:spPr>
+        <p:txBody>
+          <a:bodyPr/>
+          <a:lstStyle/>
+          <a:p>
+            <a:r>
               <a:rPr lang="en-CA" b="1" dirty="0">
                 <a:latin typeface="Aptos" panose="020B0004020202020204" pitchFamily="34" charset="0"/>
               </a:rPr>
-              <a:t>Create daily diary document</a:t>
+              <a:t>Project Flow</a:t>
+            </a:r>
+          </a:p>
+        </p:txBody>
+      </p:sp>
+      <p:pic>
+        <p:nvPicPr>
+          <p:cNvPr id="91" name="Picture 4" descr="upload.wikimedia.org/wikipedia/commons/4/45/Not...">
+            <a:extLst>
+              <a:ext uri="{FF2B5EF4-FFF2-40B4-BE49-F238E27FC236}">
+                <a16:creationId xmlns:a16="http://schemas.microsoft.com/office/drawing/2014/main" id="{E156BB51-824B-B850-6D41-A1083B841772}"/>
+              </a:ext>
+            </a:extLst>
+          </p:cNvPr>
+          <p:cNvPicPr>
+            <a:picLocks noChangeAspect="1" noChangeArrowheads="1"/>
+          </p:cNvPicPr>
+          <p:nvPr/>
+        </p:nvPicPr>
+        <p:blipFill>
+          <a:blip r:embed="rId4">
+            <a:extLst>
+              <a:ext uri="{28A0092B-C50C-407E-A947-70E740481C1C}">
+                <a14:useLocalDpi xmlns:a14="http://schemas.microsoft.com/office/drawing/2010/main" val="0"/>
+              </a:ext>
+            </a:extLst>
+          </a:blip>
+          <a:srcRect/>
+          <a:stretch>
+            <a:fillRect/>
+          </a:stretch>
+        </p:blipFill>
+        <p:spPr bwMode="auto">
+          <a:xfrm>
+            <a:off x="3175123" y="391062"/>
+            <a:ext cx="481940" cy="481940"/>
+          </a:xfrm>
+          <a:prstGeom prst="rect">
+            <a:avLst/>
+          </a:prstGeom>
+          <a:noFill/>
+          <a:extLst>
+            <a:ext uri="{909E8E84-426E-40DD-AFC4-6F175D3DCCD1}">
+              <a14:hiddenFill xmlns:a14="http://schemas.microsoft.com/office/drawing/2010/main">
+                <a:solidFill>
+                  <a:srgbClr val="FFFFFF"/>
+                </a:solidFill>
+              </a14:hiddenFill>
+            </a:ext>
+          </a:extLst>
+        </p:spPr>
+      </p:pic>
+      <p:pic>
+        <p:nvPicPr>
+          <p:cNvPr id="92" name="Picture 2" descr="upload.wikimedia.org/wikipedia/commons/thumb/a/...">
+            <a:extLst>
+              <a:ext uri="{FF2B5EF4-FFF2-40B4-BE49-F238E27FC236}">
+                <a16:creationId xmlns:a16="http://schemas.microsoft.com/office/drawing/2014/main" id="{573E2EC6-D8D9-5CB2-F516-CFE1E414BB77}"/>
+              </a:ext>
+            </a:extLst>
+          </p:cNvPr>
+          <p:cNvPicPr>
+            <a:picLocks noChangeAspect="1" noChangeArrowheads="1"/>
+          </p:cNvPicPr>
+          <p:nvPr/>
+        </p:nvPicPr>
+        <p:blipFill>
+          <a:blip r:embed="rId5">
+            <a:extLst>
+              <a:ext uri="{28A0092B-C50C-407E-A947-70E740481C1C}">
+                <a14:useLocalDpi xmlns:a14="http://schemas.microsoft.com/office/drawing/2010/main" val="0"/>
+              </a:ext>
+            </a:extLst>
+          </a:blip>
+          <a:srcRect/>
+          <a:stretch>
+            <a:fillRect/>
+          </a:stretch>
+        </p:blipFill>
+        <p:spPr bwMode="auto">
+          <a:xfrm>
+            <a:off x="5028977" y="5935998"/>
+            <a:ext cx="439301" cy="439301"/>
+          </a:xfrm>
+          <a:prstGeom prst="rect">
+            <a:avLst/>
+          </a:prstGeom>
+          <a:noFill/>
+          <a:extLst>
+            <a:ext uri="{909E8E84-426E-40DD-AFC4-6F175D3DCCD1}">
+              <a14:hiddenFill xmlns:a14="http://schemas.microsoft.com/office/drawing/2010/main">
+                <a:solidFill>
+                  <a:srgbClr val="FFFFFF"/>
+                </a:solidFill>
+              </a14:hiddenFill>
+            </a:ext>
+          </a:extLst>
+        </p:spPr>
+      </p:pic>
+      <p:pic>
+        <p:nvPicPr>
+          <p:cNvPr id="93" name="Picture 2" descr="upload.wikimedia.org/wikipedia/commons/thumb/a/...">
+            <a:extLst>
+              <a:ext uri="{FF2B5EF4-FFF2-40B4-BE49-F238E27FC236}">
+                <a16:creationId xmlns:a16="http://schemas.microsoft.com/office/drawing/2014/main" id="{A0AD5956-4839-74DA-CC3F-400D9134EC13}"/>
+              </a:ext>
+            </a:extLst>
+          </p:cNvPr>
+          <p:cNvPicPr>
+            <a:picLocks noChangeAspect="1" noChangeArrowheads="1"/>
+          </p:cNvPicPr>
+          <p:nvPr/>
+        </p:nvPicPr>
+        <p:blipFill>
+          <a:blip r:embed="rId5">
+            <a:extLst>
+              <a:ext uri="{28A0092B-C50C-407E-A947-70E740481C1C}">
+                <a14:useLocalDpi xmlns:a14="http://schemas.microsoft.com/office/drawing/2010/main" val="0"/>
+              </a:ext>
+            </a:extLst>
+          </a:blip>
+          <a:srcRect/>
+          <a:stretch>
+            <a:fillRect/>
+          </a:stretch>
+        </p:blipFill>
+        <p:spPr bwMode="auto">
+          <a:xfrm>
+            <a:off x="10486749" y="5999351"/>
+            <a:ext cx="439301" cy="439301"/>
+          </a:xfrm>
+          <a:prstGeom prst="rect">
+            <a:avLst/>
+          </a:prstGeom>
+          <a:noFill/>
+          <a:extLst>
+            <a:ext uri="{909E8E84-426E-40DD-AFC4-6F175D3DCCD1}">
+              <a14:hiddenFill xmlns:a14="http://schemas.microsoft.com/office/drawing/2010/main">
+                <a:solidFill>
+                  <a:srgbClr val="FFFFFF"/>
+                </a:solidFill>
+              </a14:hiddenFill>
+            </a:ext>
+          </a:extLst>
+        </p:spPr>
+      </p:pic>
+      <p:pic>
+        <p:nvPicPr>
+          <p:cNvPr id="94" name="Picture 4" descr="upload.wikimedia.org/wikipedia/commons/4/45/Not...">
+            <a:extLst>
+              <a:ext uri="{FF2B5EF4-FFF2-40B4-BE49-F238E27FC236}">
+                <a16:creationId xmlns:a16="http://schemas.microsoft.com/office/drawing/2014/main" id="{B1A9F130-4B8A-D135-FDE0-9CF8848082B0}"/>
+              </a:ext>
+            </a:extLst>
+          </p:cNvPr>
+          <p:cNvPicPr>
+            <a:picLocks noChangeAspect="1" noChangeArrowheads="1"/>
+          </p:cNvPicPr>
+          <p:nvPr/>
+        </p:nvPicPr>
+        <p:blipFill>
+          <a:blip r:embed="rId4">
+            <a:extLst>
+              <a:ext uri="{28A0092B-C50C-407E-A947-70E740481C1C}">
+                <a14:useLocalDpi xmlns:a14="http://schemas.microsoft.com/office/drawing/2010/main" val="0"/>
+              </a:ext>
+            </a:extLst>
+          </a:blip>
+          <a:srcRect/>
+          <a:stretch>
+            <a:fillRect/>
+          </a:stretch>
+        </p:blipFill>
+        <p:spPr bwMode="auto">
+          <a:xfrm>
+            <a:off x="3211420" y="5883627"/>
+            <a:ext cx="481940" cy="481940"/>
+          </a:xfrm>
+          <a:prstGeom prst="rect">
+            <a:avLst/>
+          </a:prstGeom>
+          <a:noFill/>
+          <a:extLst>
+            <a:ext uri="{909E8E84-426E-40DD-AFC4-6F175D3DCCD1}">
+              <a14:hiddenFill xmlns:a14="http://schemas.microsoft.com/office/drawing/2010/main">
+                <a:solidFill>
+                  <a:srgbClr val="FFFFFF"/>
+                </a:solidFill>
+              </a14:hiddenFill>
+            </a:ext>
+          </a:extLst>
+        </p:spPr>
+      </p:pic>
+      <p:pic>
+        <p:nvPicPr>
+          <p:cNvPr id="96" name="Picture 4" descr="upload.wikimedia.org/wikipedia/commons/4/45/Not...">
+            <a:extLst>
+              <a:ext uri="{FF2B5EF4-FFF2-40B4-BE49-F238E27FC236}">
+                <a16:creationId xmlns:a16="http://schemas.microsoft.com/office/drawing/2014/main" id="{26F35CB9-FEE6-0284-19A3-9F67E55D5208}"/>
+              </a:ext>
+            </a:extLst>
+          </p:cNvPr>
+          <p:cNvPicPr>
+            <a:picLocks noChangeAspect="1" noChangeArrowheads="1"/>
+          </p:cNvPicPr>
+          <p:nvPr/>
+        </p:nvPicPr>
+        <p:blipFill>
+          <a:blip r:embed="rId4">
+            <a:extLst>
+              <a:ext uri="{28A0092B-C50C-407E-A947-70E740481C1C}">
+                <a14:useLocalDpi xmlns:a14="http://schemas.microsoft.com/office/drawing/2010/main" val="0"/>
+              </a:ext>
+            </a:extLst>
+          </a:blip>
+          <a:srcRect/>
+          <a:stretch>
+            <a:fillRect/>
+          </a:stretch>
+        </p:blipFill>
+        <p:spPr bwMode="auto">
+          <a:xfrm>
+            <a:off x="8641497" y="425640"/>
+            <a:ext cx="481940" cy="481940"/>
+          </a:xfrm>
+          <a:prstGeom prst="rect">
+            <a:avLst/>
+          </a:prstGeom>
+          <a:noFill/>
+          <a:extLst>
+            <a:ext uri="{909E8E84-426E-40DD-AFC4-6F175D3DCCD1}">
+              <a14:hiddenFill xmlns:a14="http://schemas.microsoft.com/office/drawing/2010/main">
+                <a:solidFill>
+                  <a:srgbClr val="FFFFFF"/>
+                </a:solidFill>
+              </a14:hiddenFill>
+            </a:ext>
+          </a:extLst>
+        </p:spPr>
+      </p:pic>
+      <p:pic>
+        <p:nvPicPr>
+          <p:cNvPr id="97" name="Picture 4" descr="upload.wikimedia.org/wikipedia/commons/4/45/Not...">
+            <a:extLst>
+              <a:ext uri="{FF2B5EF4-FFF2-40B4-BE49-F238E27FC236}">
+                <a16:creationId xmlns:a16="http://schemas.microsoft.com/office/drawing/2014/main" id="{E10A34E5-DE3A-591C-E6DF-A38D57A251B0}"/>
+              </a:ext>
+            </a:extLst>
+          </p:cNvPr>
+          <p:cNvPicPr>
+            <a:picLocks noChangeAspect="1" noChangeArrowheads="1"/>
+          </p:cNvPicPr>
+          <p:nvPr/>
+        </p:nvPicPr>
+        <p:blipFill>
+          <a:blip r:embed="rId4">
+            <a:extLst>
+              <a:ext uri="{28A0092B-C50C-407E-A947-70E740481C1C}">
+                <a14:useLocalDpi xmlns:a14="http://schemas.microsoft.com/office/drawing/2010/main" val="0"/>
+              </a:ext>
+            </a:extLst>
+          </a:blip>
+          <a:srcRect/>
+          <a:stretch>
+            <a:fillRect/>
+          </a:stretch>
+        </p:blipFill>
+        <p:spPr bwMode="auto">
+          <a:xfrm>
+            <a:off x="8619868" y="5969670"/>
+            <a:ext cx="481940" cy="481940"/>
+          </a:xfrm>
+          <a:prstGeom prst="rect">
+            <a:avLst/>
+          </a:prstGeom>
+          <a:noFill/>
+          <a:extLst>
+            <a:ext uri="{909E8E84-426E-40DD-AFC4-6F175D3DCCD1}">
+              <a14:hiddenFill xmlns:a14="http://schemas.microsoft.com/office/drawing/2010/main">
+                <a:solidFill>
+                  <a:srgbClr val="FFFFFF"/>
+                </a:solidFill>
+              </a14:hiddenFill>
+            </a:ext>
+          </a:extLst>
+        </p:spPr>
+      </p:pic>
+      <p:pic>
+        <p:nvPicPr>
+          <p:cNvPr id="98" name="Picture 4" descr="upload.wikimedia.org/wikipedia/commons/4/45/Not...">
+            <a:extLst>
+              <a:ext uri="{FF2B5EF4-FFF2-40B4-BE49-F238E27FC236}">
+                <a16:creationId xmlns:a16="http://schemas.microsoft.com/office/drawing/2014/main" id="{2EB3A336-5000-12F0-ADCE-0B35DEDCB7C5}"/>
+              </a:ext>
+            </a:extLst>
+          </p:cNvPr>
+          <p:cNvPicPr>
+            <a:picLocks noChangeAspect="1" noChangeArrowheads="1"/>
+          </p:cNvPicPr>
+          <p:nvPr/>
+        </p:nvPicPr>
+        <p:blipFill>
+          <a:blip r:embed="rId4">
+            <a:extLst>
+              <a:ext uri="{28A0092B-C50C-407E-A947-70E740481C1C}">
+                <a14:useLocalDpi xmlns:a14="http://schemas.microsoft.com/office/drawing/2010/main" val="0"/>
+              </a:ext>
+            </a:extLst>
+          </a:blip>
+          <a:srcRect/>
+          <a:stretch>
+            <a:fillRect/>
+          </a:stretch>
+        </p:blipFill>
+        <p:spPr bwMode="auto">
+          <a:xfrm>
+            <a:off x="5929228" y="3137980"/>
+            <a:ext cx="481940" cy="481940"/>
+          </a:xfrm>
+          <a:prstGeom prst="rect">
+            <a:avLst/>
+          </a:prstGeom>
+          <a:noFill/>
+          <a:extLst>
+            <a:ext uri="{909E8E84-426E-40DD-AFC4-6F175D3DCCD1}">
+              <a14:hiddenFill xmlns:a14="http://schemas.microsoft.com/office/drawing/2010/main">
+                <a:solidFill>
+                  <a:srgbClr val="FFFFFF"/>
+                </a:solidFill>
+              </a14:hiddenFill>
+            </a:ext>
+          </a:extLst>
+        </p:spPr>
+      </p:pic>
+      <p:pic>
+        <p:nvPicPr>
+          <p:cNvPr id="99" name="Picture 4" descr="upload.wikimedia.org/wikipedia/commons/4/45/Not...">
+            <a:extLst>
+              <a:ext uri="{FF2B5EF4-FFF2-40B4-BE49-F238E27FC236}">
+                <a16:creationId xmlns:a16="http://schemas.microsoft.com/office/drawing/2014/main" id="{817AFF54-1B93-497C-6D7D-E12EFBD8913F}"/>
+              </a:ext>
+            </a:extLst>
+          </p:cNvPr>
+          <p:cNvPicPr>
+            <a:picLocks noChangeAspect="1" noChangeArrowheads="1"/>
+          </p:cNvPicPr>
+          <p:nvPr/>
+        </p:nvPicPr>
+        <p:blipFill>
+          <a:blip r:embed="rId4">
+            <a:extLst>
+              <a:ext uri="{28A0092B-C50C-407E-A947-70E740481C1C}">
+                <a14:useLocalDpi xmlns:a14="http://schemas.microsoft.com/office/drawing/2010/main" val="0"/>
+              </a:ext>
+            </a:extLst>
+          </a:blip>
+          <a:srcRect/>
+          <a:stretch>
+            <a:fillRect/>
+          </a:stretch>
+        </p:blipFill>
+        <p:spPr bwMode="auto">
+          <a:xfrm>
+            <a:off x="11320607" y="3133460"/>
+            <a:ext cx="481940" cy="481940"/>
+          </a:xfrm>
+          <a:prstGeom prst="rect">
+            <a:avLst/>
+          </a:prstGeom>
+          <a:noFill/>
+          <a:extLst>
+            <a:ext uri="{909E8E84-426E-40DD-AFC4-6F175D3DCCD1}">
+              <a14:hiddenFill xmlns:a14="http://schemas.microsoft.com/office/drawing/2010/main">
+                <a:solidFill>
+                  <a:srgbClr val="FFFFFF"/>
+                </a:solidFill>
+              </a14:hiddenFill>
+            </a:ext>
+          </a:extLst>
+        </p:spPr>
+      </p:pic>
+      <p:pic>
+        <p:nvPicPr>
+          <p:cNvPr id="100" name="Picture 2" descr="upload.wikimedia.org/wikipedia/commons/thumb/a/...">
+            <a:extLst>
+              <a:ext uri="{FF2B5EF4-FFF2-40B4-BE49-F238E27FC236}">
+                <a16:creationId xmlns:a16="http://schemas.microsoft.com/office/drawing/2014/main" id="{EC181B7B-1A1F-7994-5A66-B92497BE245D}"/>
+              </a:ext>
+            </a:extLst>
+          </p:cNvPr>
+          <p:cNvPicPr>
+            <a:picLocks noChangeAspect="1" noChangeArrowheads="1"/>
+          </p:cNvPicPr>
+          <p:nvPr/>
+        </p:nvPicPr>
+        <p:blipFill>
+          <a:blip r:embed="rId5">
+            <a:extLst>
+              <a:ext uri="{28A0092B-C50C-407E-A947-70E740481C1C}">
+                <a14:useLocalDpi xmlns:a14="http://schemas.microsoft.com/office/drawing/2010/main" val="0"/>
+              </a:ext>
+            </a:extLst>
+          </a:blip>
+          <a:srcRect/>
+          <a:stretch>
+            <a:fillRect/>
+          </a:stretch>
+        </p:blipFill>
+        <p:spPr bwMode="auto">
+          <a:xfrm>
+            <a:off x="6856154" y="425640"/>
+            <a:ext cx="439301" cy="439301"/>
+          </a:xfrm>
+          <a:prstGeom prst="rect">
+            <a:avLst/>
+          </a:prstGeom>
+          <a:noFill/>
+          <a:extLst>
+            <a:ext uri="{909E8E84-426E-40DD-AFC4-6F175D3DCCD1}">
+              <a14:hiddenFill xmlns:a14="http://schemas.microsoft.com/office/drawing/2010/main">
+                <a:solidFill>
+                  <a:srgbClr val="FFFFFF"/>
+                </a:solidFill>
+              </a14:hiddenFill>
+            </a:ext>
+          </a:extLst>
+        </p:spPr>
+      </p:pic>
+      <p:sp>
+        <p:nvSpPr>
+          <p:cNvPr id="101" name="Title 1">
+            <a:extLst>
+              <a:ext uri="{FF2B5EF4-FFF2-40B4-BE49-F238E27FC236}">
+                <a16:creationId xmlns:a16="http://schemas.microsoft.com/office/drawing/2014/main" id="{18032546-11BF-2F64-C600-95AE5D938869}"/>
+              </a:ext>
+            </a:extLst>
+          </p:cNvPr>
+          <p:cNvSpPr txBox="1">
+            <a:spLocks/>
+          </p:cNvSpPr>
+          <p:nvPr/>
+        </p:nvSpPr>
+        <p:spPr>
+          <a:xfrm>
+            <a:off x="322285" y="6098002"/>
+            <a:ext cx="2485167" cy="554594"/>
+          </a:xfrm>
+          <a:prstGeom prst="rect">
+            <a:avLst/>
+          </a:prstGeom>
+        </p:spPr>
+        <p:txBody>
+          <a:bodyPr vert="horz" lIns="91440" tIns="45720" rIns="91440" bIns="45720" rtlCol="0" anchor="ctr">
+            <a:normAutofit lnSpcReduction="10000"/>
+          </a:bodyPr>
+          <a:lstStyle>
+            <a:lvl1pPr algn="l" defTabSz="914400" rtl="0" eaLnBrk="1" latinLnBrk="0" hangingPunct="1">
+              <a:lnSpc>
+                <a:spcPct val="90000"/>
+              </a:lnSpc>
+              <a:spcBef>
+                <a:spcPct val="0"/>
+              </a:spcBef>
+              <a:buNone/>
+              <a:defRPr sz="4400" kern="1200">
+                <a:solidFill>
+                  <a:schemeClr val="tx1"/>
+                </a:solidFill>
+                <a:latin typeface="+mj-lt"/>
+                <a:ea typeface="+mj-ea"/>
+                <a:cs typeface="+mj-cs"/>
+              </a:defRPr>
+            </a:lvl1pPr>
+          </a:lstStyle>
+          <a:p>
+            <a:r>
+              <a:rPr lang="en-CA" sz="1800" b="1" dirty="0">
+                <a:solidFill>
+                  <a:schemeClr val="accent5"/>
+                </a:solidFill>
+                <a:latin typeface="Aptos" panose="020B0004020202020204" pitchFamily="34" charset="0"/>
+              </a:rPr>
+              <a:t>Notion API</a:t>
+            </a:r>
+          </a:p>
+          <a:p>
+            <a:r>
+              <a:rPr lang="en-CA" sz="1800" b="1" dirty="0">
+                <a:solidFill>
+                  <a:schemeClr val="accent2"/>
+                </a:solidFill>
+                <a:latin typeface="Aptos" panose="020B0004020202020204" pitchFamily="34" charset="0"/>
+              </a:rPr>
+              <a:t>Google Calendar API</a:t>
+            </a:r>
+          </a:p>
+        </p:txBody>
+      </p:sp>
+      <p:sp>
+        <p:nvSpPr>
+          <p:cNvPr id="102" name="Title 1">
+            <a:extLst>
+              <a:ext uri="{FF2B5EF4-FFF2-40B4-BE49-F238E27FC236}">
+                <a16:creationId xmlns:a16="http://schemas.microsoft.com/office/drawing/2014/main" id="{4E694E70-E885-3526-CA66-9C169D20F9AA}"/>
+              </a:ext>
+            </a:extLst>
+          </p:cNvPr>
+          <p:cNvSpPr txBox="1">
+            <a:spLocks/>
+          </p:cNvSpPr>
+          <p:nvPr/>
+        </p:nvSpPr>
+        <p:spPr>
+          <a:xfrm>
+            <a:off x="322500" y="4381591"/>
+            <a:ext cx="2097326" cy="554594"/>
+          </a:xfrm>
+          <a:prstGeom prst="rect">
+            <a:avLst/>
+          </a:prstGeom>
+        </p:spPr>
+        <p:txBody>
+          <a:bodyPr vert="horz" lIns="91440" tIns="45720" rIns="91440" bIns="45720" rtlCol="0" anchor="ctr">
+            <a:normAutofit/>
+          </a:bodyPr>
+          <a:lstStyle>
+            <a:lvl1pPr algn="l" defTabSz="914400" rtl="0" eaLnBrk="1" latinLnBrk="0" hangingPunct="1">
+              <a:lnSpc>
+                <a:spcPct val="90000"/>
+              </a:lnSpc>
+              <a:spcBef>
+                <a:spcPct val="0"/>
+              </a:spcBef>
+              <a:buNone/>
+              <a:defRPr sz="4400" kern="1200">
+                <a:solidFill>
+                  <a:schemeClr val="tx1"/>
+                </a:solidFill>
+                <a:latin typeface="+mj-lt"/>
+                <a:ea typeface="+mj-ea"/>
+                <a:cs typeface="+mj-cs"/>
+              </a:defRPr>
+            </a:lvl1pPr>
+          </a:lstStyle>
+          <a:p>
+            <a:r>
+              <a:rPr lang="en-CA" sz="1800" dirty="0">
+                <a:latin typeface="Aptos" panose="020B0004020202020204" pitchFamily="34" charset="0"/>
+              </a:rPr>
+              <a:t>Project DiarySetup</a:t>
             </a:r>
           </a:p>
         </p:txBody>
@@ -5247,7 +7583,7 @@
     </p:spTree>
     <p:extLst>
       <p:ext uri="{BB962C8B-B14F-4D97-AF65-F5344CB8AC3E}">
-        <p14:creationId xmlns:p14="http://schemas.microsoft.com/office/powerpoint/2010/main" val="2602476562"/>
+        <p14:creationId xmlns:p14="http://schemas.microsoft.com/office/powerpoint/2010/main" val="3716690766"/>
       </p:ext>
     </p:extLst>
   </p:cSld>
@@ -5257,7 +7593,7 @@
 </p:sld>
 </file>
 
-<file path=ppt/slides/slide6.xml><?xml version="1.0" encoding="utf-8"?>
+<file path=ppt/slides/slide7.xml><?xml version="1.0" encoding="utf-8"?>
 <p:sld xmlns:a="http://schemas.openxmlformats.org/drawingml/2006/main" xmlns:r="http://schemas.openxmlformats.org/officeDocument/2006/relationships" xmlns:p="http://schemas.openxmlformats.org/presentationml/2006/main">
   <p:cSld>
     <p:spTree>

</xml_diff>